<commit_message>
Added some information about weak pointers.
</commit_message>
<xml_diff>
--- a/Presentations/SmartPointers.pptx
+++ b/Presentations/SmartPointers.pptx
@@ -13,16 +13,19 @@
     <p:sldId id="261" r:id="rId7"/>
     <p:sldId id="262" r:id="rId8"/>
     <p:sldId id="263" r:id="rId9"/>
-    <p:sldId id="264" r:id="rId10"/>
-    <p:sldId id="265" r:id="rId11"/>
-    <p:sldId id="266" r:id="rId12"/>
-    <p:sldId id="267" r:id="rId13"/>
-    <p:sldId id="268" r:id="rId14"/>
-    <p:sldId id="269" r:id="rId15"/>
-    <p:sldId id="270" r:id="rId16"/>
-    <p:sldId id="271" r:id="rId17"/>
-    <p:sldId id="272" r:id="rId18"/>
+    <p:sldId id="274" r:id="rId10"/>
+    <p:sldId id="264" r:id="rId11"/>
+    <p:sldId id="265" r:id="rId12"/>
+    <p:sldId id="266" r:id="rId13"/>
+    <p:sldId id="267" r:id="rId14"/>
+    <p:sldId id="268" r:id="rId15"/>
+    <p:sldId id="269" r:id="rId16"/>
+    <p:sldId id="270" r:id="rId17"/>
+    <p:sldId id="271" r:id="rId18"/>
     <p:sldId id="273" r:id="rId19"/>
+    <p:sldId id="275" r:id="rId20"/>
+    <p:sldId id="276" r:id="rId21"/>
+    <p:sldId id="277" r:id="rId22"/>
   </p:sldIdLst>
   <p:sldSz cx="12192000" cy="6858000"/>
   <p:notesSz cx="6858000" cy="9144000"/>
@@ -276,7 +279,7 @@
           <a:p>
             <a:fld id="{5AA3FC92-2F93-D944-8FD6-887BDD756061}" type="datetimeFigureOut">
               <a:rPr lang="en-US" smtClean="0"/>
-              <a:t>10/23/23</a:t>
+              <a:t>11/9/23</a:t>
             </a:fld>
             <a:endParaRPr lang="en-US"/>
           </a:p>
@@ -474,7 +477,7 @@
           <a:p>
             <a:fld id="{5AA3FC92-2F93-D944-8FD6-887BDD756061}" type="datetimeFigureOut">
               <a:rPr lang="en-US" smtClean="0"/>
-              <a:t>10/23/23</a:t>
+              <a:t>11/9/23</a:t>
             </a:fld>
             <a:endParaRPr lang="en-US"/>
           </a:p>
@@ -682,7 +685,7 @@
           <a:p>
             <a:fld id="{5AA3FC92-2F93-D944-8FD6-887BDD756061}" type="datetimeFigureOut">
               <a:rPr lang="en-US" smtClean="0"/>
-              <a:t>10/23/23</a:t>
+              <a:t>11/9/23</a:t>
             </a:fld>
             <a:endParaRPr lang="en-US"/>
           </a:p>
@@ -880,7 +883,7 @@
           <a:p>
             <a:fld id="{5AA3FC92-2F93-D944-8FD6-887BDD756061}" type="datetimeFigureOut">
               <a:rPr lang="en-US" smtClean="0"/>
-              <a:t>10/23/23</a:t>
+              <a:t>11/9/23</a:t>
             </a:fld>
             <a:endParaRPr lang="en-US"/>
           </a:p>
@@ -1155,7 +1158,7 @@
           <a:p>
             <a:fld id="{5AA3FC92-2F93-D944-8FD6-887BDD756061}" type="datetimeFigureOut">
               <a:rPr lang="en-US" smtClean="0"/>
-              <a:t>10/23/23</a:t>
+              <a:t>11/9/23</a:t>
             </a:fld>
             <a:endParaRPr lang="en-US"/>
           </a:p>
@@ -1420,7 +1423,7 @@
           <a:p>
             <a:fld id="{5AA3FC92-2F93-D944-8FD6-887BDD756061}" type="datetimeFigureOut">
               <a:rPr lang="en-US" smtClean="0"/>
-              <a:t>10/23/23</a:t>
+              <a:t>11/9/23</a:t>
             </a:fld>
             <a:endParaRPr lang="en-US"/>
           </a:p>
@@ -1832,7 +1835,7 @@
           <a:p>
             <a:fld id="{5AA3FC92-2F93-D944-8FD6-887BDD756061}" type="datetimeFigureOut">
               <a:rPr lang="en-US" smtClean="0"/>
-              <a:t>10/23/23</a:t>
+              <a:t>11/9/23</a:t>
             </a:fld>
             <a:endParaRPr lang="en-US"/>
           </a:p>
@@ -1973,7 +1976,7 @@
           <a:p>
             <a:fld id="{5AA3FC92-2F93-D944-8FD6-887BDD756061}" type="datetimeFigureOut">
               <a:rPr lang="en-US" smtClean="0"/>
-              <a:t>10/23/23</a:t>
+              <a:t>11/9/23</a:t>
             </a:fld>
             <a:endParaRPr lang="en-US"/>
           </a:p>
@@ -2086,7 +2089,7 @@
           <a:p>
             <a:fld id="{5AA3FC92-2F93-D944-8FD6-887BDD756061}" type="datetimeFigureOut">
               <a:rPr lang="en-US" smtClean="0"/>
-              <a:t>10/23/23</a:t>
+              <a:t>11/9/23</a:t>
             </a:fld>
             <a:endParaRPr lang="en-US"/>
           </a:p>
@@ -2397,7 +2400,7 @@
           <a:p>
             <a:fld id="{5AA3FC92-2F93-D944-8FD6-887BDD756061}" type="datetimeFigureOut">
               <a:rPr lang="en-US" smtClean="0"/>
-              <a:t>10/23/23</a:t>
+              <a:t>11/9/23</a:t>
             </a:fld>
             <a:endParaRPr lang="en-US"/>
           </a:p>
@@ -2685,7 +2688,7 @@
           <a:p>
             <a:fld id="{5AA3FC92-2F93-D944-8FD6-887BDD756061}" type="datetimeFigureOut">
               <a:rPr lang="en-US" smtClean="0"/>
-              <a:t>10/23/23</a:t>
+              <a:t>11/9/23</a:t>
             </a:fld>
             <a:endParaRPr lang="en-US"/>
           </a:p>
@@ -2926,7 +2929,7 @@
           <a:p>
             <a:fld id="{5AA3FC92-2F93-D944-8FD6-887BDD756061}" type="datetimeFigureOut">
               <a:rPr lang="en-US" smtClean="0"/>
-              <a:t>10/23/23</a:t>
+              <a:t>11/9/23</a:t>
             </a:fld>
             <a:endParaRPr lang="en-US"/>
           </a:p>
@@ -3446,7 +3449,7 @@
           <p:cNvPr id="2" name="Title 1">
             <a:extLst>
               <a:ext uri="{FF2B5EF4-FFF2-40B4-BE49-F238E27FC236}">
-                <a16:creationId xmlns:a16="http://schemas.microsoft.com/office/drawing/2014/main" id="{A0FF4AD9-4E34-2DF9-9A93-90FCE0E2A4C5}"/>
+                <a16:creationId xmlns:a16="http://schemas.microsoft.com/office/drawing/2014/main" id="{266971D1-1CC6-6FFF-0470-11E5F7FB91D8}"/>
               </a:ext>
             </a:extLst>
           </p:cNvPr>
@@ -3464,39 +3467,56 @@
           <a:p>
             <a:r>
               <a:rPr lang="en-US" dirty="0"/>
-              <a:t>Examples</a:t>
-            </a:r>
-          </a:p>
-        </p:txBody>
-      </p:sp>
-      <p:sp>
-        <p:nvSpPr>
-          <p:cNvPr id="4" name="TextBox 3">
-            <a:extLst>
-              <a:ext uri="{FF2B5EF4-FFF2-40B4-BE49-F238E27FC236}">
-                <a16:creationId xmlns:a16="http://schemas.microsoft.com/office/drawing/2014/main" id="{79847854-0250-EEAD-C10C-55B1589996ED}"/>
-              </a:ext>
-            </a:extLst>
-          </p:cNvPr>
-          <p:cNvSpPr txBox="1"/>
-          <p:nvPr/>
-        </p:nvSpPr>
-        <p:spPr>
-          <a:xfrm>
-            <a:off x="748221" y="1690688"/>
-            <a:ext cx="10695557" cy="2031325"/>
-          </a:xfrm>
-          <a:prstGeom prst="rect">
-            <a:avLst/>
-          </a:prstGeom>
-          <a:noFill/>
-        </p:spPr>
-        <p:txBody>
-          <a:bodyPr wrap="none" rtlCol="0">
-            <a:spAutoFit/>
-          </a:bodyPr>
-          <a:lstStyle/>
-          <a:p>
+              <a:t>No Copying</a:t>
+            </a:r>
+          </a:p>
+        </p:txBody>
+      </p:sp>
+      <p:sp>
+        <p:nvSpPr>
+          <p:cNvPr id="3" name="Content Placeholder 2">
+            <a:extLst>
+              <a:ext uri="{FF2B5EF4-FFF2-40B4-BE49-F238E27FC236}">
+                <a16:creationId xmlns:a16="http://schemas.microsoft.com/office/drawing/2014/main" id="{FFF03700-B5D7-2002-54C1-2AB5C5CD4F6D}"/>
+              </a:ext>
+            </a:extLst>
+          </p:cNvPr>
+          <p:cNvSpPr>
+            <a:spLocks noGrp="1"/>
+          </p:cNvSpPr>
+          <p:nvPr>
+            <p:ph idx="1"/>
+          </p:nvPr>
+        </p:nvSpPr>
+        <p:spPr/>
+        <p:txBody>
+          <a:bodyPr/>
+          <a:lstStyle/>
+          <a:p>
+            <a:r>
+              <a:rPr lang="en-US" i="1" dirty="0"/>
+              <a:t>Unique pointers cannot be copied!</a:t>
+            </a:r>
+          </a:p>
+          <a:p>
+            <a:pPr lvl="1"/>
+            <a:r>
+              <a:rPr lang="en-US" dirty="0"/>
+              <a:t>Doing so would result in two pointers that point at the same object, completely negating the purpose of unique pointers!</a:t>
+            </a:r>
+          </a:p>
+          <a:p>
+            <a:r>
+              <a:rPr lang="en-US" dirty="0"/>
+              <a:t>Isn’t that limiting?</a:t>
+            </a:r>
+          </a:p>
+          <a:p>
+            <a:pPr lvl="1"/>
+            <a:r>
+              <a:rPr lang="en-US" dirty="0"/>
+              <a:t>Yes, it is. However, we haven’t met </a:t>
+            </a:r>
             <a:r>
               <a:rPr lang="en-US" dirty="0">
                 <a:latin typeface="Consolas" panose="020B0609020204030204" pitchFamily="49" charset="0"/>
@@ -3509,132 +3529,71 @@
                 <a:latin typeface="Consolas" panose="020B0609020204030204" pitchFamily="49" charset="0"/>
                 <a:cs typeface="Consolas" panose="020B0609020204030204" pitchFamily="49" charset="0"/>
               </a:rPr>
+              <a:t>shared_ptr</a:t>
+            </a:r>
+            <a:r>
+              <a:rPr lang="en-US" dirty="0"/>
+              <a:t> yet. </a:t>
+            </a:r>
+            <a:r>
+              <a:rPr lang="en-US" dirty="0">
+                <a:sym typeface="Wingdings" pitchFamily="2" charset="2"/>
+              </a:rPr>
+              <a:t></a:t>
+            </a:r>
+            <a:endParaRPr lang="en-US" dirty="0"/>
+          </a:p>
+          <a:p>
+            <a:r>
+              <a:rPr lang="en-US" dirty="0"/>
+              <a:t>Unique pointers can, however, be </a:t>
+            </a:r>
+            <a:r>
+              <a:rPr lang="en-US" i="1" u="sng" dirty="0"/>
+              <a:t>moved</a:t>
+            </a:r>
+          </a:p>
+          <a:p>
+            <a:pPr lvl="1"/>
+            <a:r>
+              <a:rPr lang="en-US" dirty="0"/>
+              <a:t>Transfers ownership to the destination of the move</a:t>
+            </a:r>
+          </a:p>
+          <a:p>
+            <a:pPr lvl="1"/>
+            <a:r>
+              <a:rPr lang="en-US" dirty="0"/>
+              <a:t>The original owner no longer tries to delete the object; it is considered </a:t>
+            </a:r>
+            <a:r>
+              <a:rPr lang="en-US" i="1" dirty="0"/>
+              <a:t>empty</a:t>
+            </a:r>
+          </a:p>
+          <a:p>
+            <a:pPr lvl="1"/>
+            <a:r>
+              <a:rPr lang="en-US" dirty="0"/>
+              <a:t>A default constructed </a:t>
+            </a:r>
+            <a:r>
+              <a:rPr lang="en-US" dirty="0">
+                <a:latin typeface="Consolas" panose="020B0609020204030204" pitchFamily="49" charset="0"/>
+                <a:cs typeface="Consolas" panose="020B0609020204030204" pitchFamily="49" charset="0"/>
+              </a:rPr>
+              <a:t>std::</a:t>
+            </a:r>
+            <a:r>
+              <a:rPr lang="en-US" dirty="0" err="1">
+                <a:latin typeface="Consolas" panose="020B0609020204030204" pitchFamily="49" charset="0"/>
+                <a:cs typeface="Consolas" panose="020B0609020204030204" pitchFamily="49" charset="0"/>
+              </a:rPr>
               <a:t>unique_ptr</a:t>
             </a:r>
             <a:r>
-              <a:rPr lang="en-US" dirty="0">
-                <a:latin typeface="Consolas" panose="020B0609020204030204" pitchFamily="49" charset="0"/>
-                <a:cs typeface="Consolas" panose="020B0609020204030204" pitchFamily="49" charset="0"/>
-              </a:rPr>
-              <a:t>&lt;</a:t>
-            </a:r>
-            <a:r>
-              <a:rPr lang="en-US" b="1" dirty="0">
-                <a:latin typeface="Consolas" panose="020B0609020204030204" pitchFamily="49" charset="0"/>
-                <a:cs typeface="Consolas" panose="020B0609020204030204" pitchFamily="49" charset="0"/>
-              </a:rPr>
-              <a:t>int</a:t>
-            </a:r>
-            <a:r>
-              <a:rPr lang="en-US" dirty="0">
-                <a:latin typeface="Consolas" panose="020B0609020204030204" pitchFamily="49" charset="0"/>
-                <a:cs typeface="Consolas" panose="020B0609020204030204" pitchFamily="49" charset="0"/>
-              </a:rPr>
-              <a:t>&gt; p1{ </a:t>
-            </a:r>
-            <a:r>
-              <a:rPr lang="en-US" b="1" dirty="0">
-                <a:latin typeface="Consolas" panose="020B0609020204030204" pitchFamily="49" charset="0"/>
-                <a:cs typeface="Consolas" panose="020B0609020204030204" pitchFamily="49" charset="0"/>
-              </a:rPr>
-              <a:t>new</a:t>
-            </a:r>
-            <a:r>
-              <a:rPr lang="en-US" dirty="0">
-                <a:latin typeface="Consolas" panose="020B0609020204030204" pitchFamily="49" charset="0"/>
-                <a:cs typeface="Consolas" panose="020B0609020204030204" pitchFamily="49" charset="0"/>
-              </a:rPr>
-              <a:t> </a:t>
-            </a:r>
-            <a:r>
-              <a:rPr lang="en-US" b="1" dirty="0">
-                <a:latin typeface="Consolas" panose="020B0609020204030204" pitchFamily="49" charset="0"/>
-                <a:cs typeface="Consolas" panose="020B0609020204030204" pitchFamily="49" charset="0"/>
-              </a:rPr>
-              <a:t>int</a:t>
-            </a:r>
-            <a:r>
-              <a:rPr lang="en-US" dirty="0">
-                <a:latin typeface="Consolas" panose="020B0609020204030204" pitchFamily="49" charset="0"/>
-                <a:cs typeface="Consolas" panose="020B0609020204030204" pitchFamily="49" charset="0"/>
-              </a:rPr>
-              <a:t>{ 42 } };</a:t>
-            </a:r>
-          </a:p>
-          <a:p>
-            <a:r>
-              <a:rPr lang="en-US" dirty="0">
-                <a:latin typeface="Consolas" panose="020B0609020204030204" pitchFamily="49" charset="0"/>
-                <a:cs typeface="Consolas" panose="020B0609020204030204" pitchFamily="49" charset="0"/>
-              </a:rPr>
-              <a:t>std::</a:t>
-            </a:r>
-            <a:r>
-              <a:rPr lang="en-US" dirty="0" err="1">
-                <a:latin typeface="Consolas" panose="020B0609020204030204" pitchFamily="49" charset="0"/>
-                <a:cs typeface="Consolas" panose="020B0609020204030204" pitchFamily="49" charset="0"/>
-              </a:rPr>
-              <a:t>unique_ptr</a:t>
-            </a:r>
-            <a:r>
-              <a:rPr lang="en-US" dirty="0">
-                <a:latin typeface="Consolas" panose="020B0609020204030204" pitchFamily="49" charset="0"/>
-                <a:cs typeface="Consolas" panose="020B0609020204030204" pitchFamily="49" charset="0"/>
-              </a:rPr>
-              <a:t>&lt;</a:t>
-            </a:r>
-            <a:r>
-              <a:rPr lang="en-US" b="1" dirty="0">
-                <a:latin typeface="Consolas" panose="020B0609020204030204" pitchFamily="49" charset="0"/>
-                <a:cs typeface="Consolas" panose="020B0609020204030204" pitchFamily="49" charset="0"/>
-              </a:rPr>
-              <a:t>int</a:t>
-            </a:r>
-            <a:r>
-              <a:rPr lang="en-US" dirty="0">
-                <a:latin typeface="Consolas" panose="020B0609020204030204" pitchFamily="49" charset="0"/>
-                <a:cs typeface="Consolas" panose="020B0609020204030204" pitchFamily="49" charset="0"/>
-              </a:rPr>
-              <a:t>&gt; p2;   // Default constructor creates an empty unique pointer</a:t>
-            </a:r>
-          </a:p>
-          <a:p>
-            <a:endParaRPr lang="en-US" dirty="0">
-              <a:latin typeface="Consolas" panose="020B0609020204030204" pitchFamily="49" charset="0"/>
-              <a:cs typeface="Consolas" panose="020B0609020204030204" pitchFamily="49" charset="0"/>
-            </a:endParaRPr>
-          </a:p>
-          <a:p>
-            <a:r>
-              <a:rPr lang="en-US" dirty="0">
-                <a:latin typeface="Consolas" panose="020B0609020204030204" pitchFamily="49" charset="0"/>
-                <a:cs typeface="Consolas" panose="020B0609020204030204" pitchFamily="49" charset="0"/>
-              </a:rPr>
-              <a:t>p2 = p1;   // Compile error! Copying not supported.</a:t>
-            </a:r>
-          </a:p>
-          <a:p>
-            <a:endParaRPr lang="en-US" dirty="0">
-              <a:latin typeface="Consolas" panose="020B0609020204030204" pitchFamily="49" charset="0"/>
-              <a:cs typeface="Consolas" panose="020B0609020204030204" pitchFamily="49" charset="0"/>
-            </a:endParaRPr>
-          </a:p>
-          <a:p>
-            <a:r>
-              <a:rPr lang="en-US" dirty="0">
-                <a:latin typeface="Consolas" panose="020B0609020204030204" pitchFamily="49" charset="0"/>
-                <a:cs typeface="Consolas" panose="020B0609020204030204" pitchFamily="49" charset="0"/>
-              </a:rPr>
-              <a:t>// Transfer ownership to p2. The destructor of p1 will no longer delete the object.</a:t>
-            </a:r>
-          </a:p>
-          <a:p>
-            <a:r>
-              <a:rPr lang="en-US" dirty="0">
-                <a:latin typeface="Consolas" panose="020B0609020204030204" pitchFamily="49" charset="0"/>
-                <a:cs typeface="Consolas" panose="020B0609020204030204" pitchFamily="49" charset="0"/>
-              </a:rPr>
-              <a:t>p2 = std::move( p1 );</a:t>
+              <a:rPr lang="en-US" dirty="0"/>
+              <a:t> is also in an empty state</a:t>
             </a:r>
           </a:p>
         </p:txBody>
@@ -3642,7 +3601,7 @@
     </p:spTree>
     <p:extLst>
       <p:ext uri="{BB962C8B-B14F-4D97-AF65-F5344CB8AC3E}">
-        <p14:creationId xmlns:p14="http://schemas.microsoft.com/office/powerpoint/2010/main" val="2201263085"/>
+        <p14:creationId xmlns:p14="http://schemas.microsoft.com/office/powerpoint/2010/main" val="1835025073"/>
       </p:ext>
     </p:extLst>
   </p:cSld>
@@ -3674,7 +3633,7 @@
           <p:cNvPr id="2" name="Title 1">
             <a:extLst>
               <a:ext uri="{FF2B5EF4-FFF2-40B4-BE49-F238E27FC236}">
-                <a16:creationId xmlns:a16="http://schemas.microsoft.com/office/drawing/2014/main" id="{28F5D96D-9324-3CF1-4858-CEDCF1068982}"/>
+                <a16:creationId xmlns:a16="http://schemas.microsoft.com/office/drawing/2014/main" id="{A0FF4AD9-4E34-2DF9-9A93-90FCE0E2A4C5}"/>
               </a:ext>
             </a:extLst>
           </p:cNvPr>
@@ -3692,80 +3651,165 @@
           <a:p>
             <a:r>
               <a:rPr lang="en-US" dirty="0"/>
-              <a:t>Unique Pointers and Functions</a:t>
-            </a:r>
-          </a:p>
-        </p:txBody>
-      </p:sp>
-      <p:sp>
-        <p:nvSpPr>
-          <p:cNvPr id="3" name="Content Placeholder 2">
-            <a:extLst>
-              <a:ext uri="{FF2B5EF4-FFF2-40B4-BE49-F238E27FC236}">
-                <a16:creationId xmlns:a16="http://schemas.microsoft.com/office/drawing/2014/main" id="{8832D967-1E90-7C68-ADA4-CAE5D669EAFF}"/>
-              </a:ext>
-            </a:extLst>
-          </p:cNvPr>
-          <p:cNvSpPr>
-            <a:spLocks noGrp="1"/>
-          </p:cNvSpPr>
-          <p:nvPr>
-            <p:ph idx="1"/>
-          </p:nvPr>
-        </p:nvSpPr>
-        <p:spPr/>
-        <p:txBody>
-          <a:bodyPr/>
-          <a:lstStyle/>
-          <a:p>
-            <a:r>
-              <a:rPr lang="en-US" dirty="0"/>
-              <a:t>Unique pointers can be returned from functions</a:t>
-            </a:r>
-          </a:p>
-          <a:p>
-            <a:pPr lvl="1"/>
-            <a:r>
-              <a:rPr lang="en-US" dirty="0"/>
-              <a:t>The return value is </a:t>
-            </a:r>
-            <a:r>
-              <a:rPr lang="en-US" i="1" dirty="0"/>
-              <a:t>moved</a:t>
-            </a:r>
-            <a:r>
-              <a:rPr lang="en-US" dirty="0"/>
-              <a:t>.</a:t>
-            </a:r>
-          </a:p>
-          <a:p>
-            <a:r>
-              <a:rPr lang="en-US" dirty="0"/>
-              <a:t>Unique pointers can be passed into functions</a:t>
-            </a:r>
-          </a:p>
-          <a:p>
-            <a:pPr lvl="1"/>
-            <a:r>
-              <a:rPr lang="en-US" dirty="0"/>
-              <a:t>… using </a:t>
-            </a:r>
-            <a:r>
-              <a:rPr lang="en-US" dirty="0">
-                <a:latin typeface="Consolas" panose="020B0609020204030204" pitchFamily="49" charset="0"/>
-                <a:cs typeface="Consolas" panose="020B0609020204030204" pitchFamily="49" charset="0"/>
-              </a:rPr>
-              <a:t>std::move</a:t>
-            </a:r>
-            <a:r>
-              <a:rPr lang="en-US" dirty="0"/>
-              <a:t>.</a:t>
-            </a:r>
-          </a:p>
-          <a:p>
-            <a:r>
-              <a:rPr lang="en-US" dirty="0"/>
-              <a:t>This means ownership of an object can be passed into a function and returned from a function in a (mostly) natural way</a:t>
+              <a:t>Examples</a:t>
+            </a:r>
+          </a:p>
+        </p:txBody>
+      </p:sp>
+      <p:sp>
+        <p:nvSpPr>
+          <p:cNvPr id="4" name="TextBox 3">
+            <a:extLst>
+              <a:ext uri="{FF2B5EF4-FFF2-40B4-BE49-F238E27FC236}">
+                <a16:creationId xmlns:a16="http://schemas.microsoft.com/office/drawing/2014/main" id="{79847854-0250-EEAD-C10C-55B1589996ED}"/>
+              </a:ext>
+            </a:extLst>
+          </p:cNvPr>
+          <p:cNvSpPr txBox="1"/>
+          <p:nvPr/>
+        </p:nvSpPr>
+        <p:spPr>
+          <a:xfrm>
+            <a:off x="784881" y="1690688"/>
+            <a:ext cx="10442282" cy="2308324"/>
+          </a:xfrm>
+          <a:prstGeom prst="rect">
+            <a:avLst/>
+          </a:prstGeom>
+          <a:noFill/>
+        </p:spPr>
+        <p:txBody>
+          <a:bodyPr wrap="none" rtlCol="0">
+            <a:spAutoFit/>
+          </a:bodyPr>
+          <a:lstStyle/>
+          <a:p>
+            <a:r>
+              <a:rPr lang="en-US" b="1" dirty="0">
+                <a:latin typeface="Consolas" panose="020B0609020204030204" pitchFamily="49" charset="0"/>
+                <a:cs typeface="Consolas" panose="020B0609020204030204" pitchFamily="49" charset="0"/>
+              </a:rPr>
+              <a:t>auto</a:t>
+            </a:r>
+            <a:r>
+              <a:rPr lang="en-US" dirty="0">
+                <a:latin typeface="Consolas" panose="020B0609020204030204" pitchFamily="49" charset="0"/>
+                <a:cs typeface="Consolas" panose="020B0609020204030204" pitchFamily="49" charset="0"/>
+              </a:rPr>
+              <a:t> p1 = std::</a:t>
+            </a:r>
+            <a:r>
+              <a:rPr lang="en-US" dirty="0" err="1">
+                <a:latin typeface="Consolas" panose="020B0609020204030204" pitchFamily="49" charset="0"/>
+                <a:cs typeface="Consolas" panose="020B0609020204030204" pitchFamily="49" charset="0"/>
+              </a:rPr>
+              <a:t>make_unique</a:t>
+            </a:r>
+            <a:r>
+              <a:rPr lang="en-US" dirty="0">
+                <a:latin typeface="Consolas" panose="020B0609020204030204" pitchFamily="49" charset="0"/>
+                <a:cs typeface="Consolas" panose="020B0609020204030204" pitchFamily="49" charset="0"/>
+              </a:rPr>
+              <a:t>&lt;</a:t>
+            </a:r>
+            <a:r>
+              <a:rPr lang="en-US" b="1" dirty="0">
+                <a:latin typeface="Consolas" panose="020B0609020204030204" pitchFamily="49" charset="0"/>
+                <a:cs typeface="Consolas" panose="020B0609020204030204" pitchFamily="49" charset="0"/>
+              </a:rPr>
+              <a:t>int</a:t>
+            </a:r>
+            <a:r>
+              <a:rPr lang="en-US" dirty="0">
+                <a:latin typeface="Consolas" panose="020B0609020204030204" pitchFamily="49" charset="0"/>
+                <a:cs typeface="Consolas" panose="020B0609020204030204" pitchFamily="49" charset="0"/>
+              </a:rPr>
+              <a:t>&gt;( 42 );</a:t>
+            </a:r>
+          </a:p>
+          <a:p>
+            <a:r>
+              <a:rPr lang="en-US" dirty="0">
+                <a:latin typeface="Consolas" panose="020B0609020204030204" pitchFamily="49" charset="0"/>
+                <a:cs typeface="Consolas" panose="020B0609020204030204" pitchFamily="49" charset="0"/>
+              </a:rPr>
+              <a:t>std::</a:t>
+            </a:r>
+            <a:r>
+              <a:rPr lang="en-US" dirty="0" err="1">
+                <a:latin typeface="Consolas" panose="020B0609020204030204" pitchFamily="49" charset="0"/>
+                <a:cs typeface="Consolas" panose="020B0609020204030204" pitchFamily="49" charset="0"/>
+              </a:rPr>
+              <a:t>unique_ptr</a:t>
+            </a:r>
+            <a:r>
+              <a:rPr lang="en-US" dirty="0">
+                <a:latin typeface="Consolas" panose="020B0609020204030204" pitchFamily="49" charset="0"/>
+                <a:cs typeface="Consolas" panose="020B0609020204030204" pitchFamily="49" charset="0"/>
+              </a:rPr>
+              <a:t>&lt;</a:t>
+            </a:r>
+            <a:r>
+              <a:rPr lang="en-US" b="1" dirty="0">
+                <a:latin typeface="Consolas" panose="020B0609020204030204" pitchFamily="49" charset="0"/>
+                <a:cs typeface="Consolas" panose="020B0609020204030204" pitchFamily="49" charset="0"/>
+              </a:rPr>
+              <a:t>int</a:t>
+            </a:r>
+            <a:r>
+              <a:rPr lang="en-US" dirty="0">
+                <a:latin typeface="Consolas" panose="020B0609020204030204" pitchFamily="49" charset="0"/>
+                <a:cs typeface="Consolas" panose="020B0609020204030204" pitchFamily="49" charset="0"/>
+              </a:rPr>
+              <a:t>&gt; p2;   // Default constructor creates an empty unique pointer</a:t>
+            </a:r>
+          </a:p>
+          <a:p>
+            <a:endParaRPr lang="en-US" dirty="0">
+              <a:latin typeface="Consolas" panose="020B0609020204030204" pitchFamily="49" charset="0"/>
+              <a:cs typeface="Consolas" panose="020B0609020204030204" pitchFamily="49" charset="0"/>
+            </a:endParaRPr>
+          </a:p>
+          <a:p>
+            <a:r>
+              <a:rPr lang="en-US" dirty="0">
+                <a:latin typeface="Consolas" panose="020B0609020204030204" pitchFamily="49" charset="0"/>
+                <a:cs typeface="Consolas" panose="020B0609020204030204" pitchFamily="49" charset="0"/>
+              </a:rPr>
+              <a:t>p2 = p1;   // Compile error! Copying not supported.</a:t>
+            </a:r>
+          </a:p>
+          <a:p>
+            <a:endParaRPr lang="en-US" dirty="0">
+              <a:latin typeface="Consolas" panose="020B0609020204030204" pitchFamily="49" charset="0"/>
+              <a:cs typeface="Consolas" panose="020B0609020204030204" pitchFamily="49" charset="0"/>
+            </a:endParaRPr>
+          </a:p>
+          <a:p>
+            <a:r>
+              <a:rPr lang="en-US" dirty="0">
+                <a:latin typeface="Consolas" panose="020B0609020204030204" pitchFamily="49" charset="0"/>
+                <a:cs typeface="Consolas" panose="020B0609020204030204" pitchFamily="49" charset="0"/>
+              </a:rPr>
+              <a:t>// Transfer ownership to p2.</a:t>
+            </a:r>
+          </a:p>
+          <a:p>
+            <a:r>
+              <a:rPr lang="en-US" dirty="0">
+                <a:latin typeface="Consolas" panose="020B0609020204030204" pitchFamily="49" charset="0"/>
+                <a:cs typeface="Consolas" panose="020B0609020204030204" pitchFamily="49" charset="0"/>
+              </a:rPr>
+              <a:t>// The destructor of p1 will no longer delete the object</a:t>
+            </a:r>
+          </a:p>
+          <a:p>
+            <a:r>
+              <a:rPr lang="en-US" dirty="0">
+                <a:latin typeface="Consolas" panose="020B0609020204030204" pitchFamily="49" charset="0"/>
+                <a:cs typeface="Consolas" panose="020B0609020204030204" pitchFamily="49" charset="0"/>
+              </a:rPr>
+              <a:t>p2 = std::move( p1 );</a:t>
             </a:r>
           </a:p>
         </p:txBody>
@@ -3773,7 +3817,7 @@
     </p:spTree>
     <p:extLst>
       <p:ext uri="{BB962C8B-B14F-4D97-AF65-F5344CB8AC3E}">
-        <p14:creationId xmlns:p14="http://schemas.microsoft.com/office/powerpoint/2010/main" val="311871674"/>
+        <p14:creationId xmlns:p14="http://schemas.microsoft.com/office/powerpoint/2010/main" val="2201263085"/>
       </p:ext>
     </p:extLst>
   </p:cSld>
@@ -3805,7 +3849,7 @@
           <p:cNvPr id="2" name="Title 1">
             <a:extLst>
               <a:ext uri="{FF2B5EF4-FFF2-40B4-BE49-F238E27FC236}">
-                <a16:creationId xmlns:a16="http://schemas.microsoft.com/office/drawing/2014/main" id="{5F471156-010B-C712-8946-0FEA24D829B4}"/>
+                <a16:creationId xmlns:a16="http://schemas.microsoft.com/office/drawing/2014/main" id="{28F5D96D-9324-3CF1-4858-CEDCF1068982}"/>
               </a:ext>
             </a:extLst>
           </p:cNvPr>
@@ -3823,249 +3867,81 @@
           <a:p>
             <a:r>
               <a:rPr lang="en-US" dirty="0"/>
-              <a:t>Traditional Tree Nodes</a:t>
-            </a:r>
-          </a:p>
-        </p:txBody>
-      </p:sp>
-      <p:sp>
-        <p:nvSpPr>
-          <p:cNvPr id="3" name="TextBox 2">
-            <a:extLst>
-              <a:ext uri="{FF2B5EF4-FFF2-40B4-BE49-F238E27FC236}">
-                <a16:creationId xmlns:a16="http://schemas.microsoft.com/office/drawing/2014/main" id="{AACC4AC1-490D-CB74-ACE1-B902A53A8D96}"/>
-              </a:ext>
-            </a:extLst>
-          </p:cNvPr>
-          <p:cNvSpPr txBox="1"/>
-          <p:nvPr/>
-        </p:nvSpPr>
-        <p:spPr>
-          <a:xfrm>
-            <a:off x="838200" y="1674674"/>
-            <a:ext cx="3477234" cy="1754326"/>
-          </a:xfrm>
-          <a:prstGeom prst="rect">
-            <a:avLst/>
-          </a:prstGeom>
-          <a:noFill/>
-        </p:spPr>
-        <p:txBody>
-          <a:bodyPr wrap="none" rtlCol="0">
-            <a:spAutoFit/>
-          </a:bodyPr>
-          <a:lstStyle/>
-          <a:p>
-            <a:r>
-              <a:rPr lang="en-US" b="1" dirty="0">
-                <a:latin typeface="Consolas" panose="020B0609020204030204" pitchFamily="49" charset="0"/>
-                <a:cs typeface="Consolas" panose="020B0609020204030204" pitchFamily="49" charset="0"/>
-              </a:rPr>
-              <a:t>template</a:t>
-            </a:r>
-            <a:r>
-              <a:rPr lang="en-US" dirty="0">
-                <a:latin typeface="Consolas" panose="020B0609020204030204" pitchFamily="49" charset="0"/>
-                <a:cs typeface="Consolas" panose="020B0609020204030204" pitchFamily="49" charset="0"/>
-              </a:rPr>
-              <a:t>&lt;</a:t>
-            </a:r>
-            <a:r>
-              <a:rPr lang="en-US" b="1" dirty="0" err="1">
-                <a:latin typeface="Consolas" panose="020B0609020204030204" pitchFamily="49" charset="0"/>
-                <a:cs typeface="Consolas" panose="020B0609020204030204" pitchFamily="49" charset="0"/>
-              </a:rPr>
-              <a:t>typename</a:t>
-            </a:r>
-            <a:r>
-              <a:rPr lang="en-US" dirty="0">
-                <a:latin typeface="Consolas" panose="020B0609020204030204" pitchFamily="49" charset="0"/>
-                <a:cs typeface="Consolas" panose="020B0609020204030204" pitchFamily="49" charset="0"/>
-              </a:rPr>
-              <a:t> T&gt;</a:t>
-            </a:r>
-          </a:p>
-          <a:p>
-            <a:r>
-              <a:rPr lang="en-US" b="1" dirty="0">
-                <a:latin typeface="Consolas" panose="020B0609020204030204" pitchFamily="49" charset="0"/>
-                <a:cs typeface="Consolas" panose="020B0609020204030204" pitchFamily="49" charset="0"/>
-              </a:rPr>
-              <a:t>struct</a:t>
-            </a:r>
-            <a:r>
-              <a:rPr lang="en-US" dirty="0">
-                <a:latin typeface="Consolas" panose="020B0609020204030204" pitchFamily="49" charset="0"/>
-                <a:cs typeface="Consolas" panose="020B0609020204030204" pitchFamily="49" charset="0"/>
-              </a:rPr>
-              <a:t> </a:t>
-            </a:r>
-            <a:r>
-              <a:rPr lang="en-US" dirty="0" err="1">
-                <a:latin typeface="Consolas" panose="020B0609020204030204" pitchFamily="49" charset="0"/>
-                <a:cs typeface="Consolas" panose="020B0609020204030204" pitchFamily="49" charset="0"/>
-              </a:rPr>
-              <a:t>TreeNode</a:t>
-            </a:r>
-            <a:r>
-              <a:rPr lang="en-US" dirty="0">
-                <a:latin typeface="Consolas" panose="020B0609020204030204" pitchFamily="49" charset="0"/>
-                <a:cs typeface="Consolas" panose="020B0609020204030204" pitchFamily="49" charset="0"/>
-              </a:rPr>
-              <a:t> {</a:t>
-            </a:r>
-          </a:p>
-          <a:p>
-            <a:r>
-              <a:rPr lang="en-US" dirty="0">
-                <a:latin typeface="Consolas" panose="020B0609020204030204" pitchFamily="49" charset="0"/>
-                <a:cs typeface="Consolas" panose="020B0609020204030204" pitchFamily="49" charset="0"/>
-              </a:rPr>
-              <a:t>    T data;</a:t>
-            </a:r>
-          </a:p>
-          <a:p>
-            <a:r>
-              <a:rPr lang="en-US" dirty="0">
-                <a:latin typeface="Consolas" panose="020B0609020204030204" pitchFamily="49" charset="0"/>
-                <a:cs typeface="Consolas" panose="020B0609020204030204" pitchFamily="49" charset="0"/>
-              </a:rPr>
-              <a:t>    </a:t>
-            </a:r>
-            <a:r>
-              <a:rPr lang="en-US" dirty="0" err="1">
-                <a:latin typeface="Consolas" panose="020B0609020204030204" pitchFamily="49" charset="0"/>
-                <a:cs typeface="Consolas" panose="020B0609020204030204" pitchFamily="49" charset="0"/>
-              </a:rPr>
-              <a:t>TreeNode</a:t>
-            </a:r>
-            <a:r>
-              <a:rPr lang="en-US" dirty="0">
-                <a:latin typeface="Consolas" panose="020B0609020204030204" pitchFamily="49" charset="0"/>
-                <a:cs typeface="Consolas" panose="020B0609020204030204" pitchFamily="49" charset="0"/>
-              </a:rPr>
-              <a:t> *</a:t>
-            </a:r>
-            <a:r>
-              <a:rPr lang="en-US" dirty="0" err="1">
-                <a:latin typeface="Consolas" panose="020B0609020204030204" pitchFamily="49" charset="0"/>
-                <a:cs typeface="Consolas" panose="020B0609020204030204" pitchFamily="49" charset="0"/>
-              </a:rPr>
-              <a:t>left_child</a:t>
-            </a:r>
-            <a:r>
-              <a:rPr lang="en-US" dirty="0">
-                <a:latin typeface="Consolas" panose="020B0609020204030204" pitchFamily="49" charset="0"/>
-                <a:cs typeface="Consolas" panose="020B0609020204030204" pitchFamily="49" charset="0"/>
-              </a:rPr>
-              <a:t>;</a:t>
-            </a:r>
-          </a:p>
-          <a:p>
-            <a:r>
-              <a:rPr lang="en-US" dirty="0">
-                <a:latin typeface="Consolas" panose="020B0609020204030204" pitchFamily="49" charset="0"/>
-                <a:cs typeface="Consolas" panose="020B0609020204030204" pitchFamily="49" charset="0"/>
-              </a:rPr>
-              <a:t>    </a:t>
-            </a:r>
-            <a:r>
-              <a:rPr lang="en-US" dirty="0" err="1">
-                <a:latin typeface="Consolas" panose="020B0609020204030204" pitchFamily="49" charset="0"/>
-                <a:cs typeface="Consolas" panose="020B0609020204030204" pitchFamily="49" charset="0"/>
-              </a:rPr>
-              <a:t>TreeNode</a:t>
-            </a:r>
-            <a:r>
-              <a:rPr lang="en-US" dirty="0">
-                <a:latin typeface="Consolas" panose="020B0609020204030204" pitchFamily="49" charset="0"/>
-                <a:cs typeface="Consolas" panose="020B0609020204030204" pitchFamily="49" charset="0"/>
-              </a:rPr>
-              <a:t> *</a:t>
-            </a:r>
-            <a:r>
-              <a:rPr lang="en-US" dirty="0" err="1">
-                <a:latin typeface="Consolas" panose="020B0609020204030204" pitchFamily="49" charset="0"/>
-                <a:cs typeface="Consolas" panose="020B0609020204030204" pitchFamily="49" charset="0"/>
-              </a:rPr>
-              <a:t>right_child</a:t>
-            </a:r>
-            <a:r>
-              <a:rPr lang="en-US" dirty="0">
-                <a:latin typeface="Consolas" panose="020B0609020204030204" pitchFamily="49" charset="0"/>
-                <a:cs typeface="Consolas" panose="020B0609020204030204" pitchFamily="49" charset="0"/>
-              </a:rPr>
-              <a:t>;</a:t>
-            </a:r>
-          </a:p>
-          <a:p>
-            <a:r>
-              <a:rPr lang="en-US" dirty="0">
-                <a:latin typeface="Consolas" panose="020B0609020204030204" pitchFamily="49" charset="0"/>
-                <a:cs typeface="Consolas" panose="020B0609020204030204" pitchFamily="49" charset="0"/>
-              </a:rPr>
-              <a:t>};</a:t>
-            </a:r>
-          </a:p>
-        </p:txBody>
-      </p:sp>
-      <p:sp>
-        <p:nvSpPr>
-          <p:cNvPr id="4" name="TextBox 3">
-            <a:extLst>
-              <a:ext uri="{FF2B5EF4-FFF2-40B4-BE49-F238E27FC236}">
-                <a16:creationId xmlns:a16="http://schemas.microsoft.com/office/drawing/2014/main" id="{B02C6B7B-8D17-718F-3B0B-CF379144AD2A}"/>
-              </a:ext>
-            </a:extLst>
-          </p:cNvPr>
-          <p:cNvSpPr txBox="1"/>
-          <p:nvPr/>
-        </p:nvSpPr>
-        <p:spPr>
-          <a:xfrm>
-            <a:off x="3486183" y="4092218"/>
-            <a:ext cx="5219634" cy="646331"/>
-          </a:xfrm>
-          <a:prstGeom prst="rect">
-            <a:avLst/>
-          </a:prstGeom>
-          <a:noFill/>
-        </p:spPr>
-        <p:txBody>
-          <a:bodyPr wrap="none" rtlCol="0">
-            <a:spAutoFit/>
-          </a:bodyPr>
-          <a:lstStyle/>
-          <a:p>
-            <a:r>
-              <a:rPr lang="en-US" dirty="0"/>
-              <a:t>// Recursively crawl over the tree, deleting the nodes.</a:t>
-            </a:r>
-          </a:p>
-          <a:p>
-            <a:r>
-              <a:rPr lang="en-US" b="1" dirty="0"/>
-              <a:t>void</a:t>
-            </a:r>
-            <a:r>
-              <a:rPr lang="en-US" dirty="0"/>
-              <a:t> </a:t>
-            </a:r>
-            <a:r>
-              <a:rPr lang="en-US" dirty="0" err="1"/>
-              <a:t>destroy_tree</a:t>
-            </a:r>
-            <a:r>
-              <a:rPr lang="en-US" dirty="0"/>
-              <a:t>( </a:t>
-            </a:r>
-            <a:r>
-              <a:rPr lang="en-US" dirty="0" err="1"/>
-              <a:t>TreeNode</a:t>
-            </a:r>
-            <a:r>
-              <a:rPr lang="en-US" dirty="0"/>
-              <a:t> *node );</a:t>
+              <a:t>Unique Pointers and Functions</a:t>
+            </a:r>
+          </a:p>
+        </p:txBody>
+      </p:sp>
+      <p:sp>
+        <p:nvSpPr>
+          <p:cNvPr id="3" name="Content Placeholder 2">
+            <a:extLst>
+              <a:ext uri="{FF2B5EF4-FFF2-40B4-BE49-F238E27FC236}">
+                <a16:creationId xmlns:a16="http://schemas.microsoft.com/office/drawing/2014/main" id="{8832D967-1E90-7C68-ADA4-CAE5D669EAFF}"/>
+              </a:ext>
+            </a:extLst>
+          </p:cNvPr>
+          <p:cNvSpPr>
+            <a:spLocks noGrp="1"/>
+          </p:cNvSpPr>
+          <p:nvPr>
+            <p:ph idx="1"/>
+          </p:nvPr>
+        </p:nvSpPr>
+        <p:spPr/>
+        <p:txBody>
+          <a:bodyPr/>
+          <a:lstStyle/>
+          <a:p>
+            <a:r>
+              <a:rPr lang="en-US" dirty="0"/>
+              <a:t>Unique pointers can be returned from functions</a:t>
+            </a:r>
+          </a:p>
+          <a:p>
+            <a:pPr lvl="1"/>
+            <a:r>
+              <a:rPr lang="en-US" dirty="0"/>
+              <a:t>The return value is </a:t>
+            </a:r>
+            <a:r>
+              <a:rPr lang="en-US" i="1" dirty="0"/>
+              <a:t>moved</a:t>
+            </a:r>
+            <a:endParaRPr lang="en-US" dirty="0"/>
+          </a:p>
+          <a:p>
+            <a:r>
+              <a:rPr lang="en-US" dirty="0"/>
+              <a:t>Unique pointers can be passed into functions</a:t>
+            </a:r>
+          </a:p>
+          <a:p>
+            <a:pPr lvl="1"/>
+            <a:r>
+              <a:rPr lang="en-US" dirty="0"/>
+              <a:t>… using </a:t>
+            </a:r>
+            <a:r>
+              <a:rPr lang="en-US" dirty="0">
+                <a:latin typeface="Consolas" panose="020B0609020204030204" pitchFamily="49" charset="0"/>
+                <a:cs typeface="Consolas" panose="020B0609020204030204" pitchFamily="49" charset="0"/>
+              </a:rPr>
+              <a:t>std::move</a:t>
+            </a:r>
+            <a:endParaRPr lang="en-US" dirty="0"/>
+          </a:p>
+          <a:p>
+            <a:pPr lvl="1"/>
+            <a:r>
+              <a:rPr lang="en-US" dirty="0"/>
+              <a:t>... or by reference</a:t>
+            </a:r>
+          </a:p>
+          <a:p>
+            <a:r>
+              <a:rPr lang="en-US" dirty="0"/>
+              <a:t>This means ownership of an object can be passed into a function and returned from a function in a (mostly) natural way</a:t>
             </a:r>
           </a:p>
         </p:txBody>
@@ -4073,7 +3949,7 @@
     </p:spTree>
     <p:extLst>
       <p:ext uri="{BB962C8B-B14F-4D97-AF65-F5344CB8AC3E}">
-        <p14:creationId xmlns:p14="http://schemas.microsoft.com/office/powerpoint/2010/main" val="1351852161"/>
+        <p14:creationId xmlns:p14="http://schemas.microsoft.com/office/powerpoint/2010/main" val="311871674"/>
       </p:ext>
     </p:extLst>
   </p:cSld>
@@ -4123,7 +3999,7 @@
           <a:p>
             <a:r>
               <a:rPr lang="en-US" dirty="0"/>
-              <a:t>Tree Nodes with Unique Pointer</a:t>
+              <a:t>Traditional Binary Tree Nodes</a:t>
             </a:r>
           </a:p>
         </p:txBody>
@@ -4143,7 +4019,7 @@
         <p:spPr>
           <a:xfrm>
             <a:off x="838200" y="1674674"/>
-            <a:ext cx="5630067" cy="1754326"/>
+            <a:ext cx="2717411" cy="1754326"/>
           </a:xfrm>
           <a:prstGeom prst="rect">
             <a:avLst/>
@@ -4230,21 +4106,30 @@
                 <a:latin typeface="Consolas" panose="020B0609020204030204" pitchFamily="49" charset="0"/>
                 <a:cs typeface="Consolas" panose="020B0609020204030204" pitchFamily="49" charset="0"/>
               </a:rPr>
-              <a:t>    std::</a:t>
+              <a:t>    </a:t>
             </a:r>
             <a:r>
               <a:rPr lang="en-US" dirty="0" err="1">
                 <a:latin typeface="Consolas" panose="020B0609020204030204" pitchFamily="49" charset="0"/>
                 <a:cs typeface="Consolas" panose="020B0609020204030204" pitchFamily="49" charset="0"/>
               </a:rPr>
-              <a:t>unique_ptr</a:t>
-            </a:r>
-            <a:r>
-              <a:rPr lang="en-US" dirty="0">
-                <a:latin typeface="Consolas" panose="020B0609020204030204" pitchFamily="49" charset="0"/>
-                <a:cs typeface="Consolas" panose="020B0609020204030204" pitchFamily="49" charset="0"/>
-              </a:rPr>
-              <a:t>&lt;</a:t>
+              <a:t>TreeNode</a:t>
+            </a:r>
+            <a:r>
+              <a:rPr lang="en-US" dirty="0">
+                <a:latin typeface="Consolas" panose="020B0609020204030204" pitchFamily="49" charset="0"/>
+                <a:cs typeface="Consolas" panose="020B0609020204030204" pitchFamily="49" charset="0"/>
+              </a:rPr>
+              <a:t> *left;</a:t>
+            </a:r>
+          </a:p>
+          <a:p>
+            <a:r>
+              <a:rPr lang="en-US" dirty="0">
+                <a:latin typeface="Consolas" panose="020B0609020204030204" pitchFamily="49" charset="0"/>
+                <a:cs typeface="Consolas" panose="020B0609020204030204" pitchFamily="49" charset="0"/>
+              </a:rPr>
+              <a:t>    </a:t>
             </a:r>
             <a:r>
               <a:rPr lang="en-US" dirty="0" err="1">
@@ -4258,72 +4143,7 @@
                 <a:latin typeface="Consolas" panose="020B0609020204030204" pitchFamily="49" charset="0"/>
                 <a:cs typeface="Consolas" panose="020B0609020204030204" pitchFamily="49" charset="0"/>
               </a:rPr>
-              <a:t>&gt; </a:t>
-            </a:r>
-            <a:r>
-              <a:rPr lang="en-US" dirty="0" err="1">
-                <a:latin typeface="Consolas" panose="020B0609020204030204" pitchFamily="49" charset="0"/>
-                <a:cs typeface="Consolas" panose="020B0609020204030204" pitchFamily="49" charset="0"/>
-              </a:rPr>
-              <a:t>left_child</a:t>
-            </a:r>
-            <a:r>
-              <a:rPr lang="en-US" dirty="0">
-                <a:latin typeface="Consolas" panose="020B0609020204030204" pitchFamily="49" charset="0"/>
-                <a:cs typeface="Consolas" panose="020B0609020204030204" pitchFamily="49" charset="0"/>
-              </a:rPr>
-              <a:t>;</a:t>
-            </a:r>
-          </a:p>
-          <a:p>
-            <a:r>
-              <a:rPr lang="en-US" dirty="0">
-                <a:latin typeface="Consolas" panose="020B0609020204030204" pitchFamily="49" charset="0"/>
-                <a:cs typeface="Consolas" panose="020B0609020204030204" pitchFamily="49" charset="0"/>
-              </a:rPr>
-              <a:t>    std::</a:t>
-            </a:r>
-            <a:r>
-              <a:rPr lang="en-US" dirty="0" err="1">
-                <a:latin typeface="Consolas" panose="020B0609020204030204" pitchFamily="49" charset="0"/>
-                <a:cs typeface="Consolas" panose="020B0609020204030204" pitchFamily="49" charset="0"/>
-              </a:rPr>
-              <a:t>unique_ptr</a:t>
-            </a:r>
-            <a:r>
-              <a:rPr lang="en-US" dirty="0">
-                <a:latin typeface="Consolas" panose="020B0609020204030204" pitchFamily="49" charset="0"/>
-                <a:cs typeface="Consolas" panose="020B0609020204030204" pitchFamily="49" charset="0"/>
-              </a:rPr>
-              <a:t>&lt;</a:t>
-            </a:r>
-            <a:r>
-              <a:rPr lang="en-US" dirty="0" err="1">
-                <a:latin typeface="Consolas" panose="020B0609020204030204" pitchFamily="49" charset="0"/>
-                <a:cs typeface="Consolas" panose="020B0609020204030204" pitchFamily="49" charset="0"/>
-              </a:rPr>
-              <a:t>TreeNode</a:t>
-            </a:r>
-            <a:r>
-              <a:rPr lang="en-US" dirty="0">
-                <a:latin typeface="Consolas" panose="020B0609020204030204" pitchFamily="49" charset="0"/>
-                <a:cs typeface="Consolas" panose="020B0609020204030204" pitchFamily="49" charset="0"/>
-              </a:rPr>
-              <a:t>&gt; </a:t>
-            </a:r>
-            <a:r>
-              <a:rPr lang="en-US" dirty="0" err="1">
-                <a:latin typeface="Consolas" panose="020B0609020204030204" pitchFamily="49" charset="0"/>
-                <a:cs typeface="Consolas" panose="020B0609020204030204" pitchFamily="49" charset="0"/>
-              </a:rPr>
-              <a:t>right_child</a:t>
-            </a:r>
-            <a:r>
-              <a:rPr lang="en-US" dirty="0">
-                <a:latin typeface="Consolas" panose="020B0609020204030204" pitchFamily="49" charset="0"/>
-                <a:cs typeface="Consolas" panose="020B0609020204030204" pitchFamily="49" charset="0"/>
-              </a:rPr>
-              <a:t>;</a:t>
+              <a:t> *right;</a:t>
             </a:r>
           </a:p>
           <a:p>
@@ -4351,8 +4171,8 @@
         </p:nvSpPr>
         <p:spPr>
           <a:xfrm>
-            <a:off x="3486183" y="4092218"/>
-            <a:ext cx="5799345" cy="646331"/>
+            <a:off x="1663505" y="3994246"/>
+            <a:ext cx="7149714" cy="646331"/>
           </a:xfrm>
           <a:prstGeom prst="rect">
             <a:avLst/>
@@ -4366,34 +4186,55 @@
           <a:lstStyle/>
           <a:p>
             <a:r>
-              <a:rPr lang="en-US" dirty="0"/>
-              <a:t>// Destructor of </a:t>
-            </a:r>
-            <a:r>
-              <a:rPr lang="en-US" dirty="0" err="1"/>
+              <a:rPr lang="en-US" dirty="0">
+                <a:latin typeface="Consolas" panose="020B0609020204030204" pitchFamily="49" charset="0"/>
+                <a:cs typeface="Consolas" panose="020B0609020204030204" pitchFamily="49" charset="0"/>
+              </a:rPr>
+              <a:t>// Recursively crawl over the tree, deleting the nodes.</a:t>
+            </a:r>
+          </a:p>
+          <a:p>
+            <a:r>
+              <a:rPr lang="en-US" b="1" dirty="0">
+                <a:latin typeface="Consolas" panose="020B0609020204030204" pitchFamily="49" charset="0"/>
+                <a:cs typeface="Consolas" panose="020B0609020204030204" pitchFamily="49" charset="0"/>
+              </a:rPr>
+              <a:t>void</a:t>
+            </a:r>
+            <a:r>
+              <a:rPr lang="en-US" dirty="0">
+                <a:latin typeface="Consolas" panose="020B0609020204030204" pitchFamily="49" charset="0"/>
+                <a:cs typeface="Consolas" panose="020B0609020204030204" pitchFamily="49" charset="0"/>
+              </a:rPr>
+              <a:t> </a:t>
+            </a:r>
+            <a:r>
+              <a:rPr lang="en-US" dirty="0" err="1">
+                <a:latin typeface="Consolas" panose="020B0609020204030204" pitchFamily="49" charset="0"/>
+                <a:cs typeface="Consolas" panose="020B0609020204030204" pitchFamily="49" charset="0"/>
+              </a:rPr>
+              <a:t>destroy_tree</a:t>
+            </a:r>
+            <a:r>
+              <a:rPr lang="en-US" dirty="0">
+                <a:latin typeface="Consolas" panose="020B0609020204030204" pitchFamily="49" charset="0"/>
+                <a:cs typeface="Consolas" panose="020B0609020204030204" pitchFamily="49" charset="0"/>
+              </a:rPr>
+              <a:t>( </a:t>
+            </a:r>
+            <a:r>
+              <a:rPr lang="en-US" dirty="0" err="1">
+                <a:latin typeface="Consolas" panose="020B0609020204030204" pitchFamily="49" charset="0"/>
+                <a:cs typeface="Consolas" panose="020B0609020204030204" pitchFamily="49" charset="0"/>
+              </a:rPr>
               <a:t>TreeNode</a:t>
             </a:r>
             <a:r>
-              <a:rPr lang="en-US" dirty="0"/>
-              <a:t> destroys </a:t>
-            </a:r>
-            <a:r>
-              <a:rPr lang="en-US" dirty="0" err="1"/>
-              <a:t>left_child</a:t>
-            </a:r>
-            <a:r>
-              <a:rPr lang="en-US" dirty="0"/>
-              <a:t> and right child</a:t>
-            </a:r>
-          </a:p>
-          <a:p>
-            <a:r>
-              <a:rPr lang="en-US" b="1" dirty="0"/>
-              <a:t>delete</a:t>
-            </a:r>
-            <a:r>
-              <a:rPr lang="en-US" dirty="0"/>
-              <a:t> root;</a:t>
+              <a:rPr lang="en-US" dirty="0">
+                <a:latin typeface="Consolas" panose="020B0609020204030204" pitchFamily="49" charset="0"/>
+                <a:cs typeface="Consolas" panose="020B0609020204030204" pitchFamily="49" charset="0"/>
+              </a:rPr>
+              <a:t> *node );</a:t>
             </a:r>
           </a:p>
         </p:txBody>
@@ -4401,7 +4242,7 @@
     </p:spTree>
     <p:extLst>
       <p:ext uri="{BB962C8B-B14F-4D97-AF65-F5344CB8AC3E}">
-        <p14:creationId xmlns:p14="http://schemas.microsoft.com/office/powerpoint/2010/main" val="3294514871"/>
+        <p14:creationId xmlns:p14="http://schemas.microsoft.com/office/powerpoint/2010/main" val="1351852161"/>
       </p:ext>
     </p:extLst>
   </p:cSld>
@@ -4433,7 +4274,7 @@
           <p:cNvPr id="2" name="Title 1">
             <a:extLst>
               <a:ext uri="{FF2B5EF4-FFF2-40B4-BE49-F238E27FC236}">
-                <a16:creationId xmlns:a16="http://schemas.microsoft.com/office/drawing/2014/main" id="{BEC12CF1-84ED-F0F9-E92C-61032FAA7B3C}"/>
+                <a16:creationId xmlns:a16="http://schemas.microsoft.com/office/drawing/2014/main" id="{5F471156-010B-C712-8946-0FEA24D829B4}"/>
               </a:ext>
             </a:extLst>
           </p:cNvPr>
@@ -4451,63 +4292,17 @@
           <a:p>
             <a:r>
               <a:rPr lang="en-US" dirty="0"/>
-              <a:t>Release</a:t>
-            </a:r>
-          </a:p>
-        </p:txBody>
-      </p:sp>
-      <p:sp>
-        <p:nvSpPr>
-          <p:cNvPr id="3" name="Content Placeholder 2">
-            <a:extLst>
-              <a:ext uri="{FF2B5EF4-FFF2-40B4-BE49-F238E27FC236}">
-                <a16:creationId xmlns:a16="http://schemas.microsoft.com/office/drawing/2014/main" id="{311F4BF7-838F-DFBB-F3AB-4B26F178F6B4}"/>
-              </a:ext>
-            </a:extLst>
-          </p:cNvPr>
-          <p:cNvSpPr>
-            <a:spLocks noGrp="1"/>
-          </p:cNvSpPr>
-          <p:nvPr>
-            <p:ph idx="1"/>
-          </p:nvPr>
-        </p:nvSpPr>
-        <p:spPr/>
-        <p:txBody>
-          <a:bodyPr/>
-          <a:lstStyle/>
-          <a:p>
-            <a:r>
-              <a:rPr lang="en-US" dirty="0"/>
-              <a:t>Sometimes you need to get the raw pointer back out of the unique pointer</a:t>
-            </a:r>
-          </a:p>
-          <a:p>
-            <a:pPr lvl="1"/>
-            <a:r>
-              <a:rPr lang="en-US" dirty="0"/>
-              <a:t>Use the </a:t>
-            </a:r>
-            <a:r>
-              <a:rPr lang="en-US" dirty="0">
-                <a:latin typeface="Consolas" panose="020B0609020204030204" pitchFamily="49" charset="0"/>
-                <a:cs typeface="Consolas" panose="020B0609020204030204" pitchFamily="49" charset="0"/>
-              </a:rPr>
-              <a:t>release</a:t>
-            </a:r>
-            <a:r>
-              <a:rPr lang="en-US" dirty="0"/>
-              <a:t> method</a:t>
-            </a:r>
-          </a:p>
-        </p:txBody>
-      </p:sp>
-      <p:sp>
-        <p:nvSpPr>
-          <p:cNvPr id="4" name="TextBox 3">
-            <a:extLst>
-              <a:ext uri="{FF2B5EF4-FFF2-40B4-BE49-F238E27FC236}">
-                <a16:creationId xmlns:a16="http://schemas.microsoft.com/office/drawing/2014/main" id="{B8F3B268-4F07-5EAC-67F4-E4DE9A3A9FF2}"/>
+              <a:t>Binary Tree Nodes with Unique Pointer</a:t>
+            </a:r>
+          </a:p>
+        </p:txBody>
+      </p:sp>
+      <p:sp>
+        <p:nvSpPr>
+          <p:cNvPr id="3" name="TextBox 2">
+            <a:extLst>
+              <a:ext uri="{FF2B5EF4-FFF2-40B4-BE49-F238E27FC236}">
+                <a16:creationId xmlns:a16="http://schemas.microsoft.com/office/drawing/2014/main" id="{AACC4AC1-490D-CB74-ACE1-B902A53A8D96}"/>
               </a:ext>
             </a:extLst>
           </p:cNvPr>
@@ -4516,8 +4311,8 @@
         </p:nvSpPr>
         <p:spPr>
           <a:xfrm>
-            <a:off x="838200" y="3429000"/>
-            <a:ext cx="7276351" cy="1477328"/>
+            <a:off x="838200" y="1674674"/>
+            <a:ext cx="4870244" cy="1754326"/>
           </a:xfrm>
           <a:prstGeom prst="rect">
             <a:avLst/>
@@ -4531,17 +4326,86 @@
           <a:lstStyle/>
           <a:p>
             <a:r>
-              <a:rPr lang="en-US" dirty="0">
-                <a:latin typeface="Consolas" panose="020B0609020204030204" pitchFamily="49" charset="0"/>
-                <a:cs typeface="Consolas" panose="020B0609020204030204" pitchFamily="49" charset="0"/>
-              </a:rPr>
-              <a:t>std::</a:t>
+              <a:rPr lang="en-US" b="1" dirty="0">
+                <a:latin typeface="Consolas" panose="020B0609020204030204" pitchFamily="49" charset="0"/>
+                <a:cs typeface="Consolas" panose="020B0609020204030204" pitchFamily="49" charset="0"/>
+              </a:rPr>
+              <a:t>template</a:t>
+            </a:r>
+            <a:r>
+              <a:rPr lang="en-US" dirty="0">
+                <a:latin typeface="Consolas" panose="020B0609020204030204" pitchFamily="49" charset="0"/>
+                <a:cs typeface="Consolas" panose="020B0609020204030204" pitchFamily="49" charset="0"/>
+              </a:rPr>
+              <a:t>&lt;</a:t>
+            </a:r>
+            <a:r>
+              <a:rPr lang="en-US" b="1" dirty="0" err="1">
+                <a:latin typeface="Consolas" panose="020B0609020204030204" pitchFamily="49" charset="0"/>
+                <a:cs typeface="Consolas" panose="020B0609020204030204" pitchFamily="49" charset="0"/>
+              </a:rPr>
+              <a:t>typename</a:t>
+            </a:r>
+            <a:r>
+              <a:rPr lang="en-US" dirty="0">
+                <a:latin typeface="Consolas" panose="020B0609020204030204" pitchFamily="49" charset="0"/>
+                <a:cs typeface="Consolas" panose="020B0609020204030204" pitchFamily="49" charset="0"/>
+              </a:rPr>
+              <a:t> T&gt;</a:t>
+            </a:r>
+          </a:p>
+          <a:p>
+            <a:r>
+              <a:rPr lang="en-US" b="1" dirty="0">
+                <a:latin typeface="Consolas" panose="020B0609020204030204" pitchFamily="49" charset="0"/>
+                <a:cs typeface="Consolas" panose="020B0609020204030204" pitchFamily="49" charset="0"/>
+              </a:rPr>
+              <a:t>struct</a:t>
+            </a:r>
+            <a:r>
+              <a:rPr lang="en-US" dirty="0">
+                <a:latin typeface="Consolas" panose="020B0609020204030204" pitchFamily="49" charset="0"/>
+                <a:cs typeface="Consolas" panose="020B0609020204030204" pitchFamily="49" charset="0"/>
+              </a:rPr>
+              <a:t> </a:t>
             </a:r>
             <a:r>
               <a:rPr lang="en-US" dirty="0" err="1">
                 <a:latin typeface="Consolas" panose="020B0609020204030204" pitchFamily="49" charset="0"/>
                 <a:cs typeface="Consolas" panose="020B0609020204030204" pitchFamily="49" charset="0"/>
               </a:rPr>
+              <a:t>TreeNode</a:t>
+            </a:r>
+            <a:r>
+              <a:rPr lang="en-US" dirty="0">
+                <a:latin typeface="Consolas" panose="020B0609020204030204" pitchFamily="49" charset="0"/>
+                <a:cs typeface="Consolas" panose="020B0609020204030204" pitchFamily="49" charset="0"/>
+              </a:rPr>
+              <a:t> {</a:t>
+            </a:r>
+          </a:p>
+          <a:p>
+            <a:r>
+              <a:rPr lang="en-US" dirty="0">
+                <a:latin typeface="Consolas" panose="020B0609020204030204" pitchFamily="49" charset="0"/>
+                <a:cs typeface="Consolas" panose="020B0609020204030204" pitchFamily="49" charset="0"/>
+              </a:rPr>
+              <a:t>    T data;</a:t>
+            </a:r>
+          </a:p>
+          <a:p>
+            <a:r>
+              <a:rPr lang="en-US" dirty="0">
+                <a:latin typeface="Consolas" panose="020B0609020204030204" pitchFamily="49" charset="0"/>
+                <a:cs typeface="Consolas" panose="020B0609020204030204" pitchFamily="49" charset="0"/>
+              </a:rPr>
+              <a:t>    std::</a:t>
+            </a:r>
+            <a:r>
+              <a:rPr lang="en-US" dirty="0" err="1">
+                <a:latin typeface="Consolas" panose="020B0609020204030204" pitchFamily="49" charset="0"/>
+                <a:cs typeface="Consolas" panose="020B0609020204030204" pitchFamily="49" charset="0"/>
+              </a:rPr>
               <a:t>unique_ptr</a:t>
             </a:r>
             <a:r>
@@ -4552,97 +4416,141 @@
               <a:t>&lt;</a:t>
             </a:r>
             <a:r>
+              <a:rPr lang="en-US" dirty="0" err="1">
+                <a:latin typeface="Consolas" panose="020B0609020204030204" pitchFamily="49" charset="0"/>
+                <a:cs typeface="Consolas" panose="020B0609020204030204" pitchFamily="49" charset="0"/>
+              </a:rPr>
+              <a:t>TreeNode</a:t>
+            </a:r>
+            <a:r>
+              <a:rPr lang="en-US" dirty="0">
+                <a:latin typeface="Consolas" panose="020B0609020204030204" pitchFamily="49" charset="0"/>
+                <a:cs typeface="Consolas" panose="020B0609020204030204" pitchFamily="49" charset="0"/>
+              </a:rPr>
+              <a:t>&gt; left;</a:t>
+            </a:r>
+          </a:p>
+          <a:p>
+            <a:r>
+              <a:rPr lang="en-US" dirty="0">
+                <a:latin typeface="Consolas" panose="020B0609020204030204" pitchFamily="49" charset="0"/>
+                <a:cs typeface="Consolas" panose="020B0609020204030204" pitchFamily="49" charset="0"/>
+              </a:rPr>
+              <a:t>    std::</a:t>
+            </a:r>
+            <a:r>
+              <a:rPr lang="en-US" dirty="0" err="1">
+                <a:latin typeface="Consolas" panose="020B0609020204030204" pitchFamily="49" charset="0"/>
+                <a:cs typeface="Consolas" panose="020B0609020204030204" pitchFamily="49" charset="0"/>
+              </a:rPr>
+              <a:t>unique_ptr</a:t>
+            </a:r>
+            <a:r>
+              <a:rPr lang="en-US" dirty="0">
+                <a:latin typeface="Consolas" panose="020B0609020204030204" pitchFamily="49" charset="0"/>
+                <a:cs typeface="Consolas" panose="020B0609020204030204" pitchFamily="49" charset="0"/>
+              </a:rPr>
+              <a:t>&lt;</a:t>
+            </a:r>
+            <a:r>
+              <a:rPr lang="en-US" dirty="0" err="1">
+                <a:latin typeface="Consolas" panose="020B0609020204030204" pitchFamily="49" charset="0"/>
+                <a:cs typeface="Consolas" panose="020B0609020204030204" pitchFamily="49" charset="0"/>
+              </a:rPr>
+              <a:t>TreeNode</a:t>
+            </a:r>
+            <a:r>
+              <a:rPr lang="en-US" dirty="0">
+                <a:latin typeface="Consolas" panose="020B0609020204030204" pitchFamily="49" charset="0"/>
+                <a:cs typeface="Consolas" panose="020B0609020204030204" pitchFamily="49" charset="0"/>
+              </a:rPr>
+              <a:t>&gt; right;</a:t>
+            </a:r>
+          </a:p>
+          <a:p>
+            <a:r>
+              <a:rPr lang="en-US" dirty="0">
+                <a:latin typeface="Consolas" panose="020B0609020204030204" pitchFamily="49" charset="0"/>
+                <a:cs typeface="Consolas" panose="020B0609020204030204" pitchFamily="49" charset="0"/>
+              </a:rPr>
+              <a:t>};</a:t>
+            </a:r>
+          </a:p>
+        </p:txBody>
+      </p:sp>
+      <p:sp>
+        <p:nvSpPr>
+          <p:cNvPr id="4" name="TextBox 3">
+            <a:extLst>
+              <a:ext uri="{FF2B5EF4-FFF2-40B4-BE49-F238E27FC236}">
+                <a16:creationId xmlns:a16="http://schemas.microsoft.com/office/drawing/2014/main" id="{B02C6B7B-8D17-718F-3B0B-CF379144AD2A}"/>
+              </a:ext>
+            </a:extLst>
+          </p:cNvPr>
+          <p:cNvSpPr txBox="1"/>
+          <p:nvPr/>
+        </p:nvSpPr>
+        <p:spPr>
+          <a:xfrm>
+            <a:off x="1761319" y="3907160"/>
+            <a:ext cx="8669361" cy="923330"/>
+          </a:xfrm>
+          <a:prstGeom prst="rect">
+            <a:avLst/>
+          </a:prstGeom>
+          <a:noFill/>
+        </p:spPr>
+        <p:txBody>
+          <a:bodyPr wrap="none" rtlCol="0">
+            <a:spAutoFit/>
+          </a:bodyPr>
+          <a:lstStyle/>
+          <a:p>
+            <a:r>
+              <a:rPr lang="en-US" dirty="0">
+                <a:latin typeface="Consolas" panose="020B0609020204030204" pitchFamily="49" charset="0"/>
+                <a:cs typeface="Consolas" panose="020B0609020204030204" pitchFamily="49" charset="0"/>
+              </a:rPr>
+              <a:t>// Destructor of </a:t>
+            </a:r>
+            <a:r>
+              <a:rPr lang="en-US" dirty="0" err="1">
+                <a:latin typeface="Consolas" panose="020B0609020204030204" pitchFamily="49" charset="0"/>
+                <a:cs typeface="Consolas" panose="020B0609020204030204" pitchFamily="49" charset="0"/>
+              </a:rPr>
+              <a:t>TreeNode</a:t>
+            </a:r>
+            <a:r>
+              <a:rPr lang="en-US" dirty="0">
+                <a:latin typeface="Consolas" panose="020B0609020204030204" pitchFamily="49" charset="0"/>
+                <a:cs typeface="Consolas" panose="020B0609020204030204" pitchFamily="49" charset="0"/>
+              </a:rPr>
+              <a:t> destroys ‘left’ and ‘right’</a:t>
+            </a:r>
+          </a:p>
+          <a:p>
+            <a:r>
+              <a:rPr lang="en-US" dirty="0">
+                <a:latin typeface="Consolas" panose="020B0609020204030204" pitchFamily="49" charset="0"/>
+                <a:cs typeface="Consolas" panose="020B0609020204030204" pitchFamily="49" charset="0"/>
+              </a:rPr>
+              <a:t>// That triggers the deletion of the child nodes, etc., recursively</a:t>
+            </a:r>
+          </a:p>
+          <a:p>
+            <a:r>
               <a:rPr lang="en-US" b="1" dirty="0">
                 <a:latin typeface="Consolas" panose="020B0609020204030204" pitchFamily="49" charset="0"/>
                 <a:cs typeface="Consolas" panose="020B0609020204030204" pitchFamily="49" charset="0"/>
               </a:rPr>
-              <a:t>int</a:t>
-            </a:r>
-            <a:r>
-              <a:rPr lang="en-US" dirty="0">
-                <a:latin typeface="Consolas" panose="020B0609020204030204" pitchFamily="49" charset="0"/>
-                <a:cs typeface="Consolas" panose="020B0609020204030204" pitchFamily="49" charset="0"/>
-              </a:rPr>
-              <a:t>&gt; p{ </a:t>
-            </a:r>
-            <a:r>
-              <a:rPr lang="en-US" b="1" dirty="0">
-                <a:latin typeface="Consolas" panose="020B0609020204030204" pitchFamily="49" charset="0"/>
-                <a:cs typeface="Consolas" panose="020B0609020204030204" pitchFamily="49" charset="0"/>
-              </a:rPr>
-              <a:t>new</a:t>
-            </a:r>
-            <a:r>
-              <a:rPr lang="en-US" dirty="0">
-                <a:latin typeface="Consolas" panose="020B0609020204030204" pitchFamily="49" charset="0"/>
-                <a:cs typeface="Consolas" panose="020B0609020204030204" pitchFamily="49" charset="0"/>
-              </a:rPr>
-              <a:t> </a:t>
-            </a:r>
-            <a:r>
-              <a:rPr lang="en-US" b="1" dirty="0">
-                <a:latin typeface="Consolas" panose="020B0609020204030204" pitchFamily="49" charset="0"/>
-                <a:cs typeface="Consolas" panose="020B0609020204030204" pitchFamily="49" charset="0"/>
-              </a:rPr>
-              <a:t>int</a:t>
-            </a:r>
-            <a:r>
-              <a:rPr lang="en-US" dirty="0">
-                <a:latin typeface="Consolas" panose="020B0609020204030204" pitchFamily="49" charset="0"/>
-                <a:cs typeface="Consolas" panose="020B0609020204030204" pitchFamily="49" charset="0"/>
-              </a:rPr>
-              <a:t>{ 42 } };</a:t>
-            </a:r>
-          </a:p>
-          <a:p>
-            <a:endParaRPr lang="en-US" dirty="0">
-              <a:latin typeface="Consolas" panose="020B0609020204030204" pitchFamily="49" charset="0"/>
-              <a:cs typeface="Consolas" panose="020B0609020204030204" pitchFamily="49" charset="0"/>
-            </a:endParaRPr>
-          </a:p>
-          <a:p>
-            <a:r>
-              <a:rPr lang="en-US" dirty="0">
-                <a:latin typeface="Consolas" panose="020B0609020204030204" pitchFamily="49" charset="0"/>
-                <a:cs typeface="Consolas" panose="020B0609020204030204" pitchFamily="49" charset="0"/>
-              </a:rPr>
-              <a:t>// Do things with p</a:t>
-            </a:r>
-          </a:p>
-          <a:p>
-            <a:endParaRPr lang="en-US" dirty="0">
-              <a:latin typeface="Consolas" panose="020B0609020204030204" pitchFamily="49" charset="0"/>
-              <a:cs typeface="Consolas" panose="020B0609020204030204" pitchFamily="49" charset="0"/>
-            </a:endParaRPr>
-          </a:p>
-          <a:p>
-            <a:r>
-              <a:rPr lang="en-US" b="1" dirty="0">
-                <a:latin typeface="Consolas" panose="020B0609020204030204" pitchFamily="49" charset="0"/>
-                <a:cs typeface="Consolas" panose="020B0609020204030204" pitchFamily="49" charset="0"/>
-              </a:rPr>
-              <a:t>int</a:t>
-            </a:r>
-            <a:r>
-              <a:rPr lang="en-US" dirty="0">
-                <a:latin typeface="Consolas" panose="020B0609020204030204" pitchFamily="49" charset="0"/>
-                <a:cs typeface="Consolas" panose="020B0609020204030204" pitchFamily="49" charset="0"/>
-              </a:rPr>
-              <a:t> *pi = </a:t>
-            </a:r>
-            <a:r>
-              <a:rPr lang="en-US" dirty="0" err="1">
-                <a:latin typeface="Consolas" panose="020B0609020204030204" pitchFamily="49" charset="0"/>
-                <a:cs typeface="Consolas" panose="020B0609020204030204" pitchFamily="49" charset="0"/>
-              </a:rPr>
-              <a:t>p.release</a:t>
-            </a:r>
-            <a:r>
-              <a:rPr lang="en-US" dirty="0">
-                <a:latin typeface="Consolas" panose="020B0609020204030204" pitchFamily="49" charset="0"/>
-                <a:cs typeface="Consolas" panose="020B0609020204030204" pitchFamily="49" charset="0"/>
-              </a:rPr>
-              <a:t>( );  // p no longer owns the object.</a:t>
+              <a:t>delete</a:t>
+            </a:r>
+            <a:r>
+              <a:rPr lang="en-US" dirty="0">
+                <a:latin typeface="Consolas" panose="020B0609020204030204" pitchFamily="49" charset="0"/>
+                <a:cs typeface="Consolas" panose="020B0609020204030204" pitchFamily="49" charset="0"/>
+              </a:rPr>
+              <a:t> root;</a:t>
             </a:r>
           </a:p>
         </p:txBody>
@@ -4650,7 +4558,7 @@
     </p:spTree>
     <p:extLst>
       <p:ext uri="{BB962C8B-B14F-4D97-AF65-F5344CB8AC3E}">
-        <p14:creationId xmlns:p14="http://schemas.microsoft.com/office/powerpoint/2010/main" val="139679921"/>
+        <p14:creationId xmlns:p14="http://schemas.microsoft.com/office/powerpoint/2010/main" val="3294514871"/>
       </p:ext>
     </p:extLst>
   </p:cSld>
@@ -4682,7 +4590,7 @@
           <p:cNvPr id="2" name="Title 1">
             <a:extLst>
               <a:ext uri="{FF2B5EF4-FFF2-40B4-BE49-F238E27FC236}">
-                <a16:creationId xmlns:a16="http://schemas.microsoft.com/office/drawing/2014/main" id="{5E82E293-9E46-CCAE-2E81-6820E7AB298B}"/>
+                <a16:creationId xmlns:a16="http://schemas.microsoft.com/office/drawing/2014/main" id="{BEC12CF1-84ED-F0F9-E92C-61032FAA7B3C}"/>
               </a:ext>
             </a:extLst>
           </p:cNvPr>
@@ -4700,7 +4608,7 @@
           <a:p>
             <a:r>
               <a:rPr lang="en-US" dirty="0"/>
-              <a:t>Shared Pointers</a:t>
+              <a:t>Release</a:t>
             </a:r>
           </a:p>
         </p:txBody>
@@ -4710,7 +4618,7 @@
           <p:cNvPr id="3" name="Content Placeholder 2">
             <a:extLst>
               <a:ext uri="{FF2B5EF4-FFF2-40B4-BE49-F238E27FC236}">
-                <a16:creationId xmlns:a16="http://schemas.microsoft.com/office/drawing/2014/main" id="{D08362A9-4197-0DD3-6304-1BF7D8471EE1}"/>
+                <a16:creationId xmlns:a16="http://schemas.microsoft.com/office/drawing/2014/main" id="{311F4BF7-838F-DFBB-F3AB-4B26F178F6B4}"/>
               </a:ext>
             </a:extLst>
           </p:cNvPr>
@@ -4728,21 +4636,18 @@
           <a:p>
             <a:r>
               <a:rPr lang="en-US" dirty="0"/>
-              <a:t>Multiple shared pointers can point at the same object…</a:t>
-            </a:r>
-          </a:p>
-          <a:p>
-            <a:pPr lvl="1"/>
-            <a:r>
-              <a:rPr lang="en-US" dirty="0"/>
-              <a:t>… but they track how many such pointers exist</a:t>
-            </a:r>
-          </a:p>
-          <a:p>
-            <a:pPr lvl="1"/>
-            <a:r>
-              <a:rPr lang="en-US" dirty="0"/>
-              <a:t>… and delete the object only when the last shared pointer disappears</a:t>
+              <a:t>Sometimes you need to get the raw pointer back out of the unique pointer. Use the </a:t>
+            </a:r>
+            <a:r>
+              <a:rPr lang="en-US" dirty="0">
+                <a:latin typeface="Consolas" panose="020B0609020204030204" pitchFamily="49" charset="0"/>
+                <a:cs typeface="Consolas" panose="020B0609020204030204" pitchFamily="49" charset="0"/>
+              </a:rPr>
+              <a:t>release</a:t>
+            </a:r>
+            <a:r>
+              <a:rPr lang="en-US" dirty="0"/>
+              <a:t> method</a:t>
             </a:r>
           </a:p>
         </p:txBody>
@@ -4752,7 +4657,7 @@
           <p:cNvPr id="4" name="TextBox 3">
             <a:extLst>
               <a:ext uri="{FF2B5EF4-FFF2-40B4-BE49-F238E27FC236}">
-                <a16:creationId xmlns:a16="http://schemas.microsoft.com/office/drawing/2014/main" id="{43D49D90-4D4D-15AB-B8B6-13DA58C08B31}"/>
+                <a16:creationId xmlns:a16="http://schemas.microsoft.com/office/drawing/2014/main" id="{B8F3B268-4F07-5EAC-67F4-E4DE9A3A9FF2}"/>
               </a:ext>
             </a:extLst>
           </p:cNvPr>
@@ -4761,8 +4666,8 @@
         </p:nvSpPr>
         <p:spPr>
           <a:xfrm>
-            <a:off x="838200" y="3429000"/>
-            <a:ext cx="8289449" cy="2308324"/>
+            <a:off x="838200" y="2950028"/>
+            <a:ext cx="7276351" cy="1477328"/>
           </a:xfrm>
           <a:prstGeom prst="rect">
             <a:avLst/>
@@ -4776,18 +4681,25 @@
           <a:lstStyle/>
           <a:p>
             <a:r>
-              <a:rPr lang="en-US" dirty="0">
-                <a:latin typeface="Consolas" panose="020B0609020204030204" pitchFamily="49" charset="0"/>
-                <a:cs typeface="Consolas" panose="020B0609020204030204" pitchFamily="49" charset="0"/>
-              </a:rPr>
-              <a:t>std::</a:t>
+              <a:rPr lang="en-US" b="1" dirty="0">
+                <a:latin typeface="Consolas" panose="020B0609020204030204" pitchFamily="49" charset="0"/>
+                <a:cs typeface="Consolas" panose="020B0609020204030204" pitchFamily="49" charset="0"/>
+              </a:rPr>
+              <a:t>auto</a:t>
+            </a:r>
+            <a:r>
+              <a:rPr lang="en-US" dirty="0">
+                <a:latin typeface="Consolas" panose="020B0609020204030204" pitchFamily="49" charset="0"/>
+                <a:cs typeface="Consolas" panose="020B0609020204030204" pitchFamily="49" charset="0"/>
+              </a:rPr>
+              <a:t> p = std::</a:t>
             </a:r>
             <a:r>
               <a:rPr lang="en-US" dirty="0" err="1">
                 <a:latin typeface="Consolas" panose="020B0609020204030204" pitchFamily="49" charset="0"/>
                 <a:cs typeface="Consolas" panose="020B0609020204030204" pitchFamily="49" charset="0"/>
               </a:rPr>
-              <a:t>shared_ptr</a:t>
+              <a:t>make_unique</a:t>
             </a:r>
             <a:r>
               <a:rPr lang="en-US" dirty="0">
@@ -4808,35 +4720,7 @@
                 <a:latin typeface="Consolas" panose="020B0609020204030204" pitchFamily="49" charset="0"/>
                 <a:cs typeface="Consolas" panose="020B0609020204030204" pitchFamily="49" charset="0"/>
               </a:rPr>
-              <a:t>&gt; p1{ </a:t>
-            </a:r>
-            <a:r>
-              <a:rPr lang="en-US" b="1" dirty="0">
-                <a:latin typeface="Consolas" panose="020B0609020204030204" pitchFamily="49" charset="0"/>
-                <a:cs typeface="Consolas" panose="020B0609020204030204" pitchFamily="49" charset="0"/>
-              </a:rPr>
-              <a:t>new</a:t>
-            </a:r>
-            <a:r>
-              <a:rPr lang="en-US" dirty="0">
-                <a:latin typeface="Consolas" panose="020B0609020204030204" pitchFamily="49" charset="0"/>
-                <a:cs typeface="Consolas" panose="020B0609020204030204" pitchFamily="49" charset="0"/>
-              </a:rPr>
-              <a:t> </a:t>
-            </a:r>
-            <a:r>
-              <a:rPr lang="en-US" b="1" dirty="0">
-                <a:latin typeface="Consolas" panose="020B0609020204030204" pitchFamily="49" charset="0"/>
-                <a:cs typeface="Consolas" panose="020B0609020204030204" pitchFamily="49" charset="0"/>
-              </a:rPr>
-              <a:t>int</a:t>
-            </a:r>
-            <a:r>
-              <a:rPr lang="en-US" dirty="0">
-                <a:latin typeface="Consolas" panose="020B0609020204030204" pitchFamily="49" charset="0"/>
-                <a:cs typeface="Consolas" panose="020B0609020204030204" pitchFamily="49" charset="0"/>
-              </a:rPr>
-              <a:t>{ 42 } };</a:t>
+              <a:t>&gt;( 42 );</a:t>
             </a:r>
           </a:p>
           <a:p>
@@ -4851,53 +4735,7 @@
                 <a:latin typeface="Consolas" panose="020B0609020204030204" pitchFamily="49" charset="0"/>
                 <a:cs typeface="Consolas" panose="020B0609020204030204" pitchFamily="49" charset="0"/>
               </a:rPr>
-              <a:t>// The pointers p1 and p2 point at the same object.</a:t>
-            </a:r>
-          </a:p>
-          <a:p>
-            <a:r>
-              <a:rPr lang="en-US" dirty="0">
-                <a:latin typeface="Consolas" panose="020B0609020204030204" pitchFamily="49" charset="0"/>
-                <a:cs typeface="Consolas" panose="020B0609020204030204" pitchFamily="49" charset="0"/>
-              </a:rPr>
-              <a:t>// The object is deleted only when both p1 and p2 are destroyed.</a:t>
-            </a:r>
-          </a:p>
-          <a:p>
-            <a:r>
-              <a:rPr lang="en-US" dirty="0">
-                <a:latin typeface="Consolas" panose="020B0609020204030204" pitchFamily="49" charset="0"/>
-                <a:cs typeface="Consolas" panose="020B0609020204030204" pitchFamily="49" charset="0"/>
-              </a:rPr>
-              <a:t>std::</a:t>
-            </a:r>
-            <a:r>
-              <a:rPr lang="en-US" dirty="0" err="1">
-                <a:latin typeface="Consolas" panose="020B0609020204030204" pitchFamily="49" charset="0"/>
-                <a:cs typeface="Consolas" panose="020B0609020204030204" pitchFamily="49" charset="0"/>
-              </a:rPr>
-              <a:t>shared_ptr</a:t>
-            </a:r>
-            <a:r>
-              <a:rPr lang="en-US" dirty="0">
-                <a:latin typeface="Consolas" panose="020B0609020204030204" pitchFamily="49" charset="0"/>
-                <a:cs typeface="Consolas" panose="020B0609020204030204" pitchFamily="49" charset="0"/>
-              </a:rPr>
-              <a:t>&lt;</a:t>
-            </a:r>
-            <a:r>
-              <a:rPr lang="en-US" b="1" dirty="0">
-                <a:latin typeface="Consolas" panose="020B0609020204030204" pitchFamily="49" charset="0"/>
-                <a:cs typeface="Consolas" panose="020B0609020204030204" pitchFamily="49" charset="0"/>
-              </a:rPr>
-              <a:t>int</a:t>
-            </a:r>
-            <a:r>
-              <a:rPr lang="en-US" dirty="0">
-                <a:latin typeface="Consolas" panose="020B0609020204030204" pitchFamily="49" charset="0"/>
-                <a:cs typeface="Consolas" panose="020B0609020204030204" pitchFamily="49" charset="0"/>
-              </a:rPr>
-              <a:t>&gt; p2{ p1 };</a:t>
+              <a:t>// Do things with p</a:t>
             </a:r>
           </a:p>
           <a:p>
@@ -4908,41 +4746,32 @@
           </a:p>
           <a:p>
             <a:r>
-              <a:rPr lang="en-US" dirty="0">
-                <a:latin typeface="Consolas" panose="020B0609020204030204" pitchFamily="49" charset="0"/>
-                <a:cs typeface="Consolas" panose="020B0609020204030204" pitchFamily="49" charset="0"/>
-              </a:rPr>
-              <a:t>// Prints 2 because two shared pointers are involved.</a:t>
-            </a:r>
-          </a:p>
-          <a:p>
+              <a:rPr lang="en-US" b="1" dirty="0">
+                <a:latin typeface="Consolas" panose="020B0609020204030204" pitchFamily="49" charset="0"/>
+                <a:cs typeface="Consolas" panose="020B0609020204030204" pitchFamily="49" charset="0"/>
+              </a:rPr>
+              <a:t>int</a:t>
+            </a:r>
+            <a:r>
+              <a:rPr lang="en-US" dirty="0">
+                <a:latin typeface="Consolas" panose="020B0609020204030204" pitchFamily="49" charset="0"/>
+                <a:cs typeface="Consolas" panose="020B0609020204030204" pitchFamily="49" charset="0"/>
+              </a:rPr>
+              <a:t> *pi = </a:t>
+            </a:r>
             <a:r>
               <a:rPr lang="en-US" dirty="0" err="1">
                 <a:latin typeface="Consolas" panose="020B0609020204030204" pitchFamily="49" charset="0"/>
                 <a:cs typeface="Consolas" panose="020B0609020204030204" pitchFamily="49" charset="0"/>
               </a:rPr>
-              <a:t>cout</a:t>
-            </a:r>
-            <a:r>
-              <a:rPr lang="en-US" dirty="0">
-                <a:latin typeface="Consolas" panose="020B0609020204030204" pitchFamily="49" charset="0"/>
-                <a:cs typeface="Consolas" panose="020B0609020204030204" pitchFamily="49" charset="0"/>
-              </a:rPr>
-              <a:t> &lt;&lt; p2.use_count( ) &lt;&lt; </a:t>
-            </a:r>
-            <a:r>
-              <a:rPr lang="en-US" dirty="0" err="1">
-                <a:latin typeface="Consolas" panose="020B0609020204030204" pitchFamily="49" charset="0"/>
-                <a:cs typeface="Consolas" panose="020B0609020204030204" pitchFamily="49" charset="0"/>
-              </a:rPr>
-              <a:t>endl</a:t>
-            </a:r>
-            <a:r>
-              <a:rPr lang="en-US" dirty="0">
-                <a:latin typeface="Consolas" panose="020B0609020204030204" pitchFamily="49" charset="0"/>
-                <a:cs typeface="Consolas" panose="020B0609020204030204" pitchFamily="49" charset="0"/>
-              </a:rPr>
-              <a:t>;</a:t>
+              <a:t>p.release</a:t>
+            </a:r>
+            <a:r>
+              <a:rPr lang="en-US" dirty="0">
+                <a:latin typeface="Consolas" panose="020B0609020204030204" pitchFamily="49" charset="0"/>
+                <a:cs typeface="Consolas" panose="020B0609020204030204" pitchFamily="49" charset="0"/>
+              </a:rPr>
+              <a:t>( );  // p no longer owns the object.</a:t>
             </a:r>
           </a:p>
         </p:txBody>
@@ -4950,7 +4779,7 @@
     </p:spTree>
     <p:extLst>
       <p:ext uri="{BB962C8B-B14F-4D97-AF65-F5344CB8AC3E}">
-        <p14:creationId xmlns:p14="http://schemas.microsoft.com/office/powerpoint/2010/main" val="2542587490"/>
+        <p14:creationId xmlns:p14="http://schemas.microsoft.com/office/powerpoint/2010/main" val="139679921"/>
       </p:ext>
     </p:extLst>
   </p:cSld>
@@ -4982,7 +4811,7 @@
           <p:cNvPr id="2" name="Title 1">
             <a:extLst>
               <a:ext uri="{FF2B5EF4-FFF2-40B4-BE49-F238E27FC236}">
-                <a16:creationId xmlns:a16="http://schemas.microsoft.com/office/drawing/2014/main" id="{CA9D51F2-1D38-C73D-A57C-45021459D5B7}"/>
+                <a16:creationId xmlns:a16="http://schemas.microsoft.com/office/drawing/2014/main" id="{5E82E293-9E46-CCAE-2E81-6820E7AB298B}"/>
               </a:ext>
             </a:extLst>
           </p:cNvPr>
@@ -5000,7 +4829,81 @@
           <a:p>
             <a:r>
               <a:rPr lang="en-US" dirty="0"/>
-              <a:t>More Compelling Example</a:t>
+              <a:t>Shared Pointers</a:t>
+            </a:r>
+          </a:p>
+        </p:txBody>
+      </p:sp>
+      <p:sp>
+        <p:nvSpPr>
+          <p:cNvPr id="3" name="Content Placeholder 2">
+            <a:extLst>
+              <a:ext uri="{FF2B5EF4-FFF2-40B4-BE49-F238E27FC236}">
+                <a16:creationId xmlns:a16="http://schemas.microsoft.com/office/drawing/2014/main" id="{D08362A9-4197-0DD3-6304-1BF7D8471EE1}"/>
+              </a:ext>
+            </a:extLst>
+          </p:cNvPr>
+          <p:cNvSpPr>
+            <a:spLocks noGrp="1"/>
+          </p:cNvSpPr>
+          <p:nvPr>
+            <p:ph idx="1"/>
+          </p:nvPr>
+        </p:nvSpPr>
+        <p:spPr/>
+        <p:txBody>
+          <a:bodyPr/>
+          <a:lstStyle/>
+          <a:p>
+            <a:r>
+              <a:rPr lang="en-US" dirty="0"/>
+              <a:t>Multiple shared pointers can point at the same object…</a:t>
+            </a:r>
+          </a:p>
+          <a:p>
+            <a:pPr lvl="1"/>
+            <a:r>
+              <a:rPr lang="en-US" dirty="0"/>
+              <a:t>… but they track how many such pointers exist</a:t>
+            </a:r>
+          </a:p>
+          <a:p>
+            <a:pPr lvl="1"/>
+            <a:r>
+              <a:rPr lang="en-US" dirty="0"/>
+              <a:t>… and delete the object only when the last shared pointer disappears</a:t>
+            </a:r>
+          </a:p>
+          <a:p>
+            <a:r>
+              <a:rPr lang="en-US" dirty="0"/>
+              <a:t>This means that a </a:t>
+            </a:r>
+            <a:r>
+              <a:rPr lang="en-US" dirty="0">
+                <a:latin typeface="Consolas" panose="020B0609020204030204" pitchFamily="49" charset="0"/>
+                <a:cs typeface="Consolas" panose="020B0609020204030204" pitchFamily="49" charset="0"/>
+              </a:rPr>
+              <a:t>std::</a:t>
+            </a:r>
+            <a:r>
+              <a:rPr lang="en-US" dirty="0" err="1">
+                <a:latin typeface="Consolas" panose="020B0609020204030204" pitchFamily="49" charset="0"/>
+                <a:cs typeface="Consolas" panose="020B0609020204030204" pitchFamily="49" charset="0"/>
+              </a:rPr>
+              <a:t>shared_ptr</a:t>
+            </a:r>
+            <a:r>
+              <a:rPr lang="en-US" dirty="0"/>
+              <a:t> </a:t>
+            </a:r>
+            <a:r>
+              <a:rPr lang="en-US" i="1" dirty="0"/>
+              <a:t>can</a:t>
+            </a:r>
+            <a:r>
+              <a:rPr lang="en-US" dirty="0"/>
+              <a:t> be copied</a:t>
             </a:r>
           </a:p>
         </p:txBody>
@@ -5010,7 +4913,7 @@
           <p:cNvPr id="4" name="TextBox 3">
             <a:extLst>
               <a:ext uri="{FF2B5EF4-FFF2-40B4-BE49-F238E27FC236}">
-                <a16:creationId xmlns:a16="http://schemas.microsoft.com/office/drawing/2014/main" id="{765FAC78-BCBE-B4B6-5414-0006F5228996}"/>
+                <a16:creationId xmlns:a16="http://schemas.microsoft.com/office/drawing/2014/main" id="{43D49D90-4D4D-15AB-B8B6-13DA58C08B31}"/>
               </a:ext>
             </a:extLst>
           </p:cNvPr>
@@ -5019,8 +4922,8 @@
         </p:nvSpPr>
         <p:spPr>
           <a:xfrm>
-            <a:off x="838200" y="1690688"/>
-            <a:ext cx="8542723" cy="2862322"/>
+            <a:off x="838200" y="3646715"/>
+            <a:ext cx="8289449" cy="2308324"/>
           </a:xfrm>
           <a:prstGeom prst="rect">
             <a:avLst/>
@@ -5038,100 +4941,21 @@
                 <a:latin typeface="Consolas" panose="020B0609020204030204" pitchFamily="49" charset="0"/>
                 <a:cs typeface="Consolas" panose="020B0609020204030204" pitchFamily="49" charset="0"/>
               </a:rPr>
-              <a:t>std::vector&lt;std::</a:t>
+              <a:t>auto p1 = std::</a:t>
             </a:r>
             <a:r>
               <a:rPr lang="en-US" dirty="0" err="1">
                 <a:latin typeface="Consolas" panose="020B0609020204030204" pitchFamily="49" charset="0"/>
                 <a:cs typeface="Consolas" panose="020B0609020204030204" pitchFamily="49" charset="0"/>
               </a:rPr>
-              <a:t>shared_ptr</a:t>
-            </a:r>
-            <a:r>
-              <a:rPr lang="en-US" dirty="0">
-                <a:latin typeface="Consolas" panose="020B0609020204030204" pitchFamily="49" charset="0"/>
-                <a:cs typeface="Consolas" panose="020B0609020204030204" pitchFamily="49" charset="0"/>
-              </a:rPr>
-              <a:t>&lt;</a:t>
-            </a:r>
-            <a:r>
-              <a:rPr lang="en-US" b="1" dirty="0">
-                <a:latin typeface="Consolas" panose="020B0609020204030204" pitchFamily="49" charset="0"/>
-                <a:cs typeface="Consolas" panose="020B0609020204030204" pitchFamily="49" charset="0"/>
-              </a:rPr>
-              <a:t>int</a:t>
-            </a:r>
-            <a:r>
-              <a:rPr lang="en-US" dirty="0">
-                <a:latin typeface="Consolas" panose="020B0609020204030204" pitchFamily="49" charset="0"/>
-                <a:cs typeface="Consolas" panose="020B0609020204030204" pitchFamily="49" charset="0"/>
-              </a:rPr>
-              <a:t>&gt;&gt; </a:t>
-            </a:r>
-            <a:r>
-              <a:rPr lang="en-US" dirty="0" err="1">
-                <a:latin typeface="Consolas" panose="020B0609020204030204" pitchFamily="49" charset="0"/>
-                <a:cs typeface="Consolas" panose="020B0609020204030204" pitchFamily="49" charset="0"/>
-              </a:rPr>
-              <a:t>pVec</a:t>
-            </a:r>
-            <a:r>
-              <a:rPr lang="en-US" dirty="0">
-                <a:latin typeface="Consolas" panose="020B0609020204030204" pitchFamily="49" charset="0"/>
-                <a:cs typeface="Consolas" panose="020B0609020204030204" pitchFamily="49" charset="0"/>
-              </a:rPr>
-              <a:t>;</a:t>
-            </a:r>
-          </a:p>
-          <a:p>
-            <a:r>
-              <a:rPr lang="en-US" dirty="0">
-                <a:latin typeface="Consolas" panose="020B0609020204030204" pitchFamily="49" charset="0"/>
-                <a:cs typeface="Consolas" panose="020B0609020204030204" pitchFamily="49" charset="0"/>
-              </a:rPr>
-              <a:t>std::list&lt;std::</a:t>
-            </a:r>
-            <a:r>
-              <a:rPr lang="en-US" dirty="0" err="1">
-                <a:latin typeface="Consolas" panose="020B0609020204030204" pitchFamily="49" charset="0"/>
-                <a:cs typeface="Consolas" panose="020B0609020204030204" pitchFamily="49" charset="0"/>
-              </a:rPr>
-              <a:t>shared_ptr</a:t>
-            </a:r>
-            <a:r>
-              <a:rPr lang="en-US" dirty="0">
-                <a:latin typeface="Consolas" panose="020B0609020204030204" pitchFamily="49" charset="0"/>
-                <a:cs typeface="Consolas" panose="020B0609020204030204" pitchFamily="49" charset="0"/>
-              </a:rPr>
-              <a:t>&lt;</a:t>
-            </a:r>
-            <a:r>
-              <a:rPr lang="en-US" b="1" dirty="0">
-                <a:latin typeface="Consolas" panose="020B0609020204030204" pitchFamily="49" charset="0"/>
-                <a:cs typeface="Consolas" panose="020B0609020204030204" pitchFamily="49" charset="0"/>
-              </a:rPr>
-              <a:t>int</a:t>
-            </a:r>
-            <a:r>
-              <a:rPr lang="en-US" dirty="0">
-                <a:latin typeface="Consolas" panose="020B0609020204030204" pitchFamily="49" charset="0"/>
-                <a:cs typeface="Consolas" panose="020B0609020204030204" pitchFamily="49" charset="0"/>
-              </a:rPr>
-              <a:t>&gt;&gt; </a:t>
-            </a:r>
-            <a:r>
-              <a:rPr lang="en-US" dirty="0" err="1">
-                <a:latin typeface="Consolas" panose="020B0609020204030204" pitchFamily="49" charset="0"/>
-                <a:cs typeface="Consolas" panose="020B0609020204030204" pitchFamily="49" charset="0"/>
-              </a:rPr>
-              <a:t>pList</a:t>
-            </a:r>
-            <a:r>
-              <a:rPr lang="en-US" dirty="0">
-                <a:latin typeface="Consolas" panose="020B0609020204030204" pitchFamily="49" charset="0"/>
-                <a:cs typeface="Consolas" panose="020B0609020204030204" pitchFamily="49" charset="0"/>
-              </a:rPr>
-              <a:t>;</a:t>
+              <a:t>make_shared</a:t>
+            </a:r>
+            <a:r>
+              <a:rPr lang="en-US" dirty="0">
+                <a:latin typeface="Consolas" panose="020B0609020204030204" pitchFamily="49" charset="0"/>
+                <a:cs typeface="Consolas" panose="020B0609020204030204" pitchFamily="49" charset="0"/>
+              </a:rPr>
+              <a:t>( 42 );</a:t>
             </a:r>
           </a:p>
           <a:p>
@@ -5146,6 +4970,24 @@
                 <a:latin typeface="Consolas" panose="020B0609020204030204" pitchFamily="49" charset="0"/>
                 <a:cs typeface="Consolas" panose="020B0609020204030204" pitchFamily="49" charset="0"/>
               </a:rPr>
+              <a:t>// The pointers p1 and p2 point at the same object.</a:t>
+            </a:r>
+          </a:p>
+          <a:p>
+            <a:r>
+              <a:rPr lang="en-US" dirty="0">
+                <a:latin typeface="Consolas" panose="020B0609020204030204" pitchFamily="49" charset="0"/>
+                <a:cs typeface="Consolas" panose="020B0609020204030204" pitchFamily="49" charset="0"/>
+              </a:rPr>
+              <a:t>// The object is deleted only when both p1 and p2 are destroyed.</a:t>
+            </a:r>
+          </a:p>
+          <a:p>
+            <a:r>
+              <a:rPr lang="en-US" dirty="0">
+                <a:latin typeface="Consolas" panose="020B0609020204030204" pitchFamily="49" charset="0"/>
+                <a:cs typeface="Consolas" panose="020B0609020204030204" pitchFamily="49" charset="0"/>
+              </a:rPr>
               <a:t>std::</a:t>
             </a:r>
             <a:r>
@@ -5160,27 +5002,13 @@
                 <a:latin typeface="Consolas" panose="020B0609020204030204" pitchFamily="49" charset="0"/>
                 <a:cs typeface="Consolas" panose="020B0609020204030204" pitchFamily="49" charset="0"/>
               </a:rPr>
-              <a:t>&lt;int&gt; p{ </a:t>
+              <a:t>&lt;</a:t>
             </a:r>
             <a:r>
               <a:rPr lang="en-US" b="1" dirty="0">
                 <a:latin typeface="Consolas" panose="020B0609020204030204" pitchFamily="49" charset="0"/>
                 <a:cs typeface="Consolas" panose="020B0609020204030204" pitchFamily="49" charset="0"/>
               </a:rPr>
-              <a:t>new</a:t>
-            </a:r>
-            <a:r>
-              <a:rPr lang="en-US" dirty="0">
-                <a:latin typeface="Consolas" panose="020B0609020204030204" pitchFamily="49" charset="0"/>
-                <a:cs typeface="Consolas" panose="020B0609020204030204" pitchFamily="49" charset="0"/>
-              </a:rPr>
-              <a:t> </a:t>
-            </a:r>
-            <a:r>
-              <a:rPr lang="en-US" b="1" dirty="0">
-                <a:latin typeface="Consolas" panose="020B0609020204030204" pitchFamily="49" charset="0"/>
-                <a:cs typeface="Consolas" panose="020B0609020204030204" pitchFamily="49" charset="0"/>
-              </a:rPr>
               <a:t>int</a:t>
             </a:r>
             <a:r>
@@ -5188,7 +5016,7 @@
                 <a:latin typeface="Consolas" panose="020B0609020204030204" pitchFamily="49" charset="0"/>
                 <a:cs typeface="Consolas" panose="020B0609020204030204" pitchFamily="49" charset="0"/>
               </a:rPr>
-              <a:t>{ 42 } };</a:t>
+              <a:t>&gt; p2{ p1 };</a:t>
             </a:r>
           </a:p>
           <a:p>
@@ -5203,54 +5031,44 @@
                 <a:latin typeface="Consolas" panose="020B0609020204030204" pitchFamily="49" charset="0"/>
                 <a:cs typeface="Consolas" panose="020B0609020204030204" pitchFamily="49" charset="0"/>
               </a:rPr>
-              <a:t>// Add pointers to the same object to two different containers</a:t>
-            </a:r>
-          </a:p>
-          <a:p>
+              <a:t>// Prints 2 because two shared pointers are involved.</a:t>
+            </a:r>
+          </a:p>
+          <a:p>
+            <a:r>
+              <a:rPr lang="en-US" dirty="0">
+                <a:latin typeface="Consolas" panose="020B0609020204030204" pitchFamily="49" charset="0"/>
+                <a:cs typeface="Consolas" panose="020B0609020204030204" pitchFamily="49" charset="0"/>
+              </a:rPr>
+              <a:t>std::</a:t>
+            </a:r>
             <a:r>
               <a:rPr lang="en-US" dirty="0" err="1">
                 <a:latin typeface="Consolas" panose="020B0609020204030204" pitchFamily="49" charset="0"/>
                 <a:cs typeface="Consolas" panose="020B0609020204030204" pitchFamily="49" charset="0"/>
               </a:rPr>
-              <a:t>pVec.push_back</a:t>
-            </a:r>
-            <a:r>
-              <a:rPr lang="en-US" dirty="0">
-                <a:latin typeface="Consolas" panose="020B0609020204030204" pitchFamily="49" charset="0"/>
-                <a:cs typeface="Consolas" panose="020B0609020204030204" pitchFamily="49" charset="0"/>
-              </a:rPr>
-              <a:t>( p );</a:t>
-            </a:r>
-          </a:p>
-          <a:p>
+              <a:t>cout</a:t>
+            </a:r>
+            <a:r>
+              <a:rPr lang="en-US" dirty="0">
+                <a:latin typeface="Consolas" panose="020B0609020204030204" pitchFamily="49" charset="0"/>
+                <a:cs typeface="Consolas" panose="020B0609020204030204" pitchFamily="49" charset="0"/>
+              </a:rPr>
+              <a:t> &lt;&lt; p2.use_count( ) &lt;&lt; std::</a:t>
+            </a:r>
             <a:r>
               <a:rPr lang="en-US" dirty="0" err="1">
                 <a:latin typeface="Consolas" panose="020B0609020204030204" pitchFamily="49" charset="0"/>
                 <a:cs typeface="Consolas" panose="020B0609020204030204" pitchFamily="49" charset="0"/>
               </a:rPr>
-              <a:t>pList.push_back</a:t>
-            </a:r>
-            <a:r>
-              <a:rPr lang="en-US" dirty="0">
-                <a:latin typeface="Consolas" panose="020B0609020204030204" pitchFamily="49" charset="0"/>
-                <a:cs typeface="Consolas" panose="020B0609020204030204" pitchFamily="49" charset="0"/>
-              </a:rPr>
-              <a:t>( p );</a:t>
-            </a:r>
-          </a:p>
-          <a:p>
-            <a:endParaRPr lang="en-US" dirty="0">
-              <a:latin typeface="Consolas" panose="020B0609020204030204" pitchFamily="49" charset="0"/>
-              <a:cs typeface="Consolas" panose="020B0609020204030204" pitchFamily="49" charset="0"/>
-            </a:endParaRPr>
-          </a:p>
-          <a:p>
-            <a:r>
-              <a:rPr lang="en-US" dirty="0">
-                <a:latin typeface="Consolas" panose="020B0609020204030204" pitchFamily="49" charset="0"/>
-                <a:cs typeface="Consolas" panose="020B0609020204030204" pitchFamily="49" charset="0"/>
-              </a:rPr>
-              <a:t>// The objects get deleted only when both containers are destroyed</a:t>
+              <a:t>endl</a:t>
+            </a:r>
+            <a:r>
+              <a:rPr lang="en-US" dirty="0">
+                <a:latin typeface="Consolas" panose="020B0609020204030204" pitchFamily="49" charset="0"/>
+                <a:cs typeface="Consolas" panose="020B0609020204030204" pitchFamily="49" charset="0"/>
+              </a:rPr>
+              <a:t>;</a:t>
             </a:r>
           </a:p>
         </p:txBody>
@@ -5258,7 +5076,7 @@
     </p:spTree>
     <p:extLst>
       <p:ext uri="{BB962C8B-B14F-4D97-AF65-F5344CB8AC3E}">
-        <p14:creationId xmlns:p14="http://schemas.microsoft.com/office/powerpoint/2010/main" val="2349651125"/>
+        <p14:creationId xmlns:p14="http://schemas.microsoft.com/office/powerpoint/2010/main" val="2542587490"/>
       </p:ext>
     </p:extLst>
   </p:cSld>
@@ -5290,7 +5108,7 @@
           <p:cNvPr id="2" name="Title 1">
             <a:extLst>
               <a:ext uri="{FF2B5EF4-FFF2-40B4-BE49-F238E27FC236}">
-                <a16:creationId xmlns:a16="http://schemas.microsoft.com/office/drawing/2014/main" id="{F0A8D27D-38C7-703A-2290-FCF20F159694}"/>
+                <a16:creationId xmlns:a16="http://schemas.microsoft.com/office/drawing/2014/main" id="{CA9D51F2-1D38-C73D-A57C-45021459D5B7}"/>
               </a:ext>
             </a:extLst>
           </p:cNvPr>
@@ -5308,46 +5126,7 @@
           <a:p>
             <a:r>
               <a:rPr lang="en-US" dirty="0"/>
-              <a:t>Make Shared</a:t>
-            </a:r>
-          </a:p>
-        </p:txBody>
-      </p:sp>
-      <p:sp>
-        <p:nvSpPr>
-          <p:cNvPr id="3" name="Content Placeholder 2">
-            <a:extLst>
-              <a:ext uri="{FF2B5EF4-FFF2-40B4-BE49-F238E27FC236}">
-                <a16:creationId xmlns:a16="http://schemas.microsoft.com/office/drawing/2014/main" id="{6B43E09F-279A-15B9-E389-CD32A456D90C}"/>
-              </a:ext>
-            </a:extLst>
-          </p:cNvPr>
-          <p:cNvSpPr>
-            <a:spLocks noGrp="1"/>
-          </p:cNvSpPr>
-          <p:nvPr>
-            <p:ph idx="1"/>
-          </p:nvPr>
-        </p:nvSpPr>
-        <p:spPr/>
-        <p:txBody>
-          <a:bodyPr/>
-          <a:lstStyle/>
-          <a:p>
-            <a:r>
-              <a:rPr lang="en-US" dirty="0"/>
-              <a:t>As a convenience, and for possible performance gains, you can use the helper function (really template) </a:t>
-            </a:r>
-            <a:r>
-              <a:rPr lang="en-US" dirty="0" err="1">
-                <a:latin typeface="Consolas" panose="020B0609020204030204" pitchFamily="49" charset="0"/>
-                <a:cs typeface="Consolas" panose="020B0609020204030204" pitchFamily="49" charset="0"/>
-              </a:rPr>
-              <a:t>make_shared</a:t>
-            </a:r>
-            <a:r>
-              <a:rPr lang="en-US" dirty="0"/>
-              <a:t>.</a:t>
+              <a:t>More Compelling Example</a:t>
             </a:r>
           </a:p>
         </p:txBody>
@@ -5357,7 +5136,7 @@
           <p:cNvPr id="4" name="TextBox 3">
             <a:extLst>
               <a:ext uri="{FF2B5EF4-FFF2-40B4-BE49-F238E27FC236}">
-                <a16:creationId xmlns:a16="http://schemas.microsoft.com/office/drawing/2014/main" id="{EBC15A9D-D183-8319-197C-D90356936A27}"/>
+                <a16:creationId xmlns:a16="http://schemas.microsoft.com/office/drawing/2014/main" id="{765FAC78-BCBE-B4B6-5414-0006F5228996}"/>
               </a:ext>
             </a:extLst>
           </p:cNvPr>
@@ -5366,8 +5145,8 @@
         </p:nvSpPr>
         <p:spPr>
           <a:xfrm>
-            <a:off x="838200" y="3059668"/>
-            <a:ext cx="6263253" cy="369332"/>
+            <a:off x="838200" y="1690688"/>
+            <a:ext cx="8542723" cy="2862322"/>
           </a:xfrm>
           <a:prstGeom prst="rect">
             <a:avLst/>
@@ -5385,7 +5164,7 @@
                 <a:latin typeface="Consolas" panose="020B0609020204030204" pitchFamily="49" charset="0"/>
                 <a:cs typeface="Consolas" panose="020B0609020204030204" pitchFamily="49" charset="0"/>
               </a:rPr>
-              <a:t>std::</a:t>
+              <a:t>std::vector&lt;std::</a:t>
             </a:r>
             <a:r>
               <a:rPr lang="en-US" dirty="0" err="1">
@@ -5413,13 +5192,100 @@
                 <a:latin typeface="Consolas" panose="020B0609020204030204" pitchFamily="49" charset="0"/>
                 <a:cs typeface="Consolas" panose="020B0609020204030204" pitchFamily="49" charset="0"/>
               </a:rPr>
-              <a:t>&gt; p = </a:t>
+              <a:t>&gt;&gt; </a:t>
             </a:r>
             <a:r>
               <a:rPr lang="en-US" dirty="0" err="1">
                 <a:latin typeface="Consolas" panose="020B0609020204030204" pitchFamily="49" charset="0"/>
                 <a:cs typeface="Consolas" panose="020B0609020204030204" pitchFamily="49" charset="0"/>
               </a:rPr>
+              <a:t>pVec</a:t>
+            </a:r>
+            <a:r>
+              <a:rPr lang="en-US" dirty="0">
+                <a:latin typeface="Consolas" panose="020B0609020204030204" pitchFamily="49" charset="0"/>
+                <a:cs typeface="Consolas" panose="020B0609020204030204" pitchFamily="49" charset="0"/>
+              </a:rPr>
+              <a:t>;</a:t>
+            </a:r>
+          </a:p>
+          <a:p>
+            <a:r>
+              <a:rPr lang="en-US" dirty="0">
+                <a:latin typeface="Consolas" panose="020B0609020204030204" pitchFamily="49" charset="0"/>
+                <a:cs typeface="Consolas" panose="020B0609020204030204" pitchFamily="49" charset="0"/>
+              </a:rPr>
+              <a:t>std::list&lt;std::</a:t>
+            </a:r>
+            <a:r>
+              <a:rPr lang="en-US" dirty="0" err="1">
+                <a:latin typeface="Consolas" panose="020B0609020204030204" pitchFamily="49" charset="0"/>
+                <a:cs typeface="Consolas" panose="020B0609020204030204" pitchFamily="49" charset="0"/>
+              </a:rPr>
+              <a:t>shared_ptr</a:t>
+            </a:r>
+            <a:r>
+              <a:rPr lang="en-US" dirty="0">
+                <a:latin typeface="Consolas" panose="020B0609020204030204" pitchFamily="49" charset="0"/>
+                <a:cs typeface="Consolas" panose="020B0609020204030204" pitchFamily="49" charset="0"/>
+              </a:rPr>
+              <a:t>&lt;</a:t>
+            </a:r>
+            <a:r>
+              <a:rPr lang="en-US" b="1" dirty="0">
+                <a:latin typeface="Consolas" panose="020B0609020204030204" pitchFamily="49" charset="0"/>
+                <a:cs typeface="Consolas" panose="020B0609020204030204" pitchFamily="49" charset="0"/>
+              </a:rPr>
+              <a:t>int</a:t>
+            </a:r>
+            <a:r>
+              <a:rPr lang="en-US" dirty="0">
+                <a:latin typeface="Consolas" panose="020B0609020204030204" pitchFamily="49" charset="0"/>
+                <a:cs typeface="Consolas" panose="020B0609020204030204" pitchFamily="49" charset="0"/>
+              </a:rPr>
+              <a:t>&gt;&gt; </a:t>
+            </a:r>
+            <a:r>
+              <a:rPr lang="en-US" dirty="0" err="1">
+                <a:latin typeface="Consolas" panose="020B0609020204030204" pitchFamily="49" charset="0"/>
+                <a:cs typeface="Consolas" panose="020B0609020204030204" pitchFamily="49" charset="0"/>
+              </a:rPr>
+              <a:t>pList</a:t>
+            </a:r>
+            <a:r>
+              <a:rPr lang="en-US" dirty="0">
+                <a:latin typeface="Consolas" panose="020B0609020204030204" pitchFamily="49" charset="0"/>
+                <a:cs typeface="Consolas" panose="020B0609020204030204" pitchFamily="49" charset="0"/>
+              </a:rPr>
+              <a:t>;</a:t>
+            </a:r>
+          </a:p>
+          <a:p>
+            <a:endParaRPr lang="en-US" dirty="0">
+              <a:latin typeface="Consolas" panose="020B0609020204030204" pitchFamily="49" charset="0"/>
+              <a:cs typeface="Consolas" panose="020B0609020204030204" pitchFamily="49" charset="0"/>
+            </a:endParaRPr>
+          </a:p>
+          <a:p>
+            <a:r>
+              <a:rPr lang="en-US" b="1" dirty="0">
+                <a:latin typeface="Consolas" panose="020B0609020204030204" pitchFamily="49" charset="0"/>
+                <a:cs typeface="Consolas" panose="020B0609020204030204" pitchFamily="49" charset="0"/>
+              </a:rPr>
+              <a:t>auto</a:t>
+            </a:r>
+            <a:r>
+              <a:rPr lang="en-US" dirty="0">
+                <a:latin typeface="Consolas" panose="020B0609020204030204" pitchFamily="49" charset="0"/>
+                <a:cs typeface="Consolas" panose="020B0609020204030204" pitchFamily="49" charset="0"/>
+              </a:rPr>
+              <a:t> p = std::</a:t>
+            </a:r>
+            <a:r>
+              <a:rPr lang="en-US" dirty="0" err="1">
+                <a:latin typeface="Consolas" panose="020B0609020204030204" pitchFamily="49" charset="0"/>
+                <a:cs typeface="Consolas" panose="020B0609020204030204" pitchFamily="49" charset="0"/>
+              </a:rPr>
               <a:t>make_shared</a:t>
             </a:r>
             <a:r>
@@ -5427,21 +5293,69 @@
                 <a:latin typeface="Consolas" panose="020B0609020204030204" pitchFamily="49" charset="0"/>
                 <a:cs typeface="Consolas" panose="020B0609020204030204" pitchFamily="49" charset="0"/>
               </a:rPr>
-              <a:t>&lt;</a:t>
-            </a:r>
-            <a:r>
-              <a:rPr lang="en-US" b="1" dirty="0">
-                <a:latin typeface="Consolas" panose="020B0609020204030204" pitchFamily="49" charset="0"/>
-                <a:cs typeface="Consolas" panose="020B0609020204030204" pitchFamily="49" charset="0"/>
-              </a:rPr>
-              <a:t>int</a:t>
-            </a:r>
-            <a:r>
-              <a:rPr lang="en-US" dirty="0">
-                <a:latin typeface="Consolas" panose="020B0609020204030204" pitchFamily="49" charset="0"/>
-                <a:cs typeface="Consolas" panose="020B0609020204030204" pitchFamily="49" charset="0"/>
-              </a:rPr>
-              <a:t>&gt;( 42 );</a:t>
+              <a:t>( 42 );</a:t>
+            </a:r>
+          </a:p>
+          <a:p>
+            <a:endParaRPr lang="en-US" dirty="0">
+              <a:latin typeface="Consolas" panose="020B0609020204030204" pitchFamily="49" charset="0"/>
+              <a:cs typeface="Consolas" panose="020B0609020204030204" pitchFamily="49" charset="0"/>
+            </a:endParaRPr>
+          </a:p>
+          <a:p>
+            <a:r>
+              <a:rPr lang="en-US" dirty="0">
+                <a:latin typeface="Consolas" panose="020B0609020204030204" pitchFamily="49" charset="0"/>
+                <a:cs typeface="Consolas" panose="020B0609020204030204" pitchFamily="49" charset="0"/>
+              </a:rPr>
+              <a:t>// Add pointers to the same object to two different containers</a:t>
+            </a:r>
+          </a:p>
+          <a:p>
+            <a:r>
+              <a:rPr lang="en-US" dirty="0" err="1">
+                <a:latin typeface="Consolas" panose="020B0609020204030204" pitchFamily="49" charset="0"/>
+                <a:cs typeface="Consolas" panose="020B0609020204030204" pitchFamily="49" charset="0"/>
+              </a:rPr>
+              <a:t>pVec.push_back</a:t>
+            </a:r>
+            <a:r>
+              <a:rPr lang="en-US" dirty="0">
+                <a:latin typeface="Consolas" panose="020B0609020204030204" pitchFamily="49" charset="0"/>
+                <a:cs typeface="Consolas" panose="020B0609020204030204" pitchFamily="49" charset="0"/>
+              </a:rPr>
+              <a:t>( p );</a:t>
+            </a:r>
+          </a:p>
+          <a:p>
+            <a:r>
+              <a:rPr lang="en-US" dirty="0" err="1">
+                <a:latin typeface="Consolas" panose="020B0609020204030204" pitchFamily="49" charset="0"/>
+                <a:cs typeface="Consolas" panose="020B0609020204030204" pitchFamily="49" charset="0"/>
+              </a:rPr>
+              <a:t>pList.push_back</a:t>
+            </a:r>
+            <a:r>
+              <a:rPr lang="en-US" dirty="0">
+                <a:latin typeface="Consolas" panose="020B0609020204030204" pitchFamily="49" charset="0"/>
+                <a:cs typeface="Consolas" panose="020B0609020204030204" pitchFamily="49" charset="0"/>
+              </a:rPr>
+              <a:t>( p );</a:t>
+            </a:r>
+          </a:p>
+          <a:p>
+            <a:endParaRPr lang="en-US" dirty="0">
+              <a:latin typeface="Consolas" panose="020B0609020204030204" pitchFamily="49" charset="0"/>
+              <a:cs typeface="Consolas" panose="020B0609020204030204" pitchFamily="49" charset="0"/>
+            </a:endParaRPr>
+          </a:p>
+          <a:p>
+            <a:r>
+              <a:rPr lang="en-US" dirty="0">
+                <a:latin typeface="Consolas" panose="020B0609020204030204" pitchFamily="49" charset="0"/>
+                <a:cs typeface="Consolas" panose="020B0609020204030204" pitchFamily="49" charset="0"/>
+              </a:rPr>
+              <a:t>// The objects get deleted only when both containers are destroyed</a:t>
             </a:r>
           </a:p>
         </p:txBody>
@@ -5449,7 +5363,7 @@
     </p:spTree>
     <p:extLst>
       <p:ext uri="{BB962C8B-B14F-4D97-AF65-F5344CB8AC3E}">
-        <p14:creationId xmlns:p14="http://schemas.microsoft.com/office/powerpoint/2010/main" val="855044404"/>
+        <p14:creationId xmlns:p14="http://schemas.microsoft.com/office/powerpoint/2010/main" val="2349651125"/>
       </p:ext>
     </p:extLst>
   </p:cSld>
@@ -5499,25 +5413,25 @@
           <a:p>
             <a:r>
               <a:rPr lang="en-US" dirty="0"/>
-              <a:t>Weak Pointers</a:t>
-            </a:r>
-          </a:p>
-        </p:txBody>
-      </p:sp>
-      <p:sp>
-        <p:nvSpPr>
-          <p:cNvPr id="3" name="Content Placeholder 2">
-            <a:extLst>
-              <a:ext uri="{FF2B5EF4-FFF2-40B4-BE49-F238E27FC236}">
-                <a16:creationId xmlns:a16="http://schemas.microsoft.com/office/drawing/2014/main" id="{AD14ABB6-7599-9F6D-FA6F-4A4EEB41AAEE}"/>
-              </a:ext>
-            </a:extLst>
-          </p:cNvPr>
-          <p:cNvSpPr>
-            <a:spLocks noGrp="1"/>
-          </p:cNvSpPr>
-          <p:nvPr>
-            <p:ph idx="1"/>
+              <a:t>The Problem with Shared Pointers</a:t>
+            </a:r>
+          </a:p>
+        </p:txBody>
+      </p:sp>
+      <p:sp>
+        <p:nvSpPr>
+          <p:cNvPr id="17" name="Content Placeholder 16">
+            <a:extLst>
+              <a:ext uri="{FF2B5EF4-FFF2-40B4-BE49-F238E27FC236}">
+                <a16:creationId xmlns:a16="http://schemas.microsoft.com/office/drawing/2014/main" id="{E1344596-47A0-9428-8B10-9972458FDE95}"/>
+              </a:ext>
+            </a:extLst>
+          </p:cNvPr>
+          <p:cNvSpPr>
+            <a:spLocks noGrp="1"/>
+          </p:cNvSpPr>
+          <p:nvPr>
+            <p:ph sz="half" idx="1"/>
           </p:nvPr>
         </p:nvSpPr>
         <p:spPr/>
@@ -5526,16 +5440,947 @@
           <a:lstStyle/>
           <a:p>
             <a:r>
+              <a:rPr lang="en-US" dirty="0"/>
+              <a:t>If each node contains a shared pointer to another node in a </a:t>
+            </a:r>
+            <a:r>
               <a:rPr lang="en-US" i="1" dirty="0"/>
-              <a:t>Finish me!</a:t>
-            </a:r>
-          </a:p>
-        </p:txBody>
-      </p:sp>
+              <a:t>cycle</a:t>
+            </a:r>
+            <a:r>
+              <a:rPr lang="en-US" dirty="0"/>
+              <a:t>…</a:t>
+            </a:r>
+          </a:p>
+          <a:p>
+            <a:pPr lvl="1"/>
+            <a:r>
+              <a:rPr lang="en-US" dirty="0"/>
+              <a:t>… destroying the shared pointer </a:t>
+            </a:r>
+            <a:r>
+              <a:rPr lang="en-US" dirty="0">
+                <a:latin typeface="Consolas" panose="020B0609020204030204" pitchFamily="49" charset="0"/>
+                <a:cs typeface="Consolas" panose="020B0609020204030204" pitchFamily="49" charset="0"/>
+              </a:rPr>
+              <a:t>p</a:t>
+            </a:r>
+            <a:r>
+              <a:rPr lang="en-US" dirty="0"/>
+              <a:t> won’t delete any nodes…</a:t>
+            </a:r>
+          </a:p>
+          <a:p>
+            <a:pPr lvl="1"/>
+            <a:r>
+              <a:rPr lang="en-US" dirty="0"/>
+              <a:t>… because A still has another shared pointer that points at it</a:t>
+            </a:r>
+          </a:p>
+          <a:p>
+            <a:r>
+              <a:rPr lang="en-US" u="sng" dirty="0"/>
+              <a:t>The nodes A, B, and C can leak!</a:t>
+            </a:r>
+          </a:p>
+        </p:txBody>
+      </p:sp>
+      <p:sp>
+        <p:nvSpPr>
+          <p:cNvPr id="18" name="Content Placeholder 17">
+            <a:extLst>
+              <a:ext uri="{FF2B5EF4-FFF2-40B4-BE49-F238E27FC236}">
+                <a16:creationId xmlns:a16="http://schemas.microsoft.com/office/drawing/2014/main" id="{88F03681-B7E9-E887-3189-293FADE08D4A}"/>
+              </a:ext>
+            </a:extLst>
+          </p:cNvPr>
+          <p:cNvSpPr>
+            <a:spLocks noGrp="1"/>
+          </p:cNvSpPr>
+          <p:nvPr>
+            <p:ph sz="half" idx="2"/>
+          </p:nvPr>
+        </p:nvSpPr>
+        <p:spPr/>
+        <p:txBody>
+          <a:bodyPr/>
+          <a:lstStyle/>
+          <a:p>
+            <a:endParaRPr lang="en-US" dirty="0"/>
+          </a:p>
+        </p:txBody>
+      </p:sp>
+      <p:sp>
+        <p:nvSpPr>
+          <p:cNvPr id="4" name="Oval 3">
+            <a:extLst>
+              <a:ext uri="{FF2B5EF4-FFF2-40B4-BE49-F238E27FC236}">
+                <a16:creationId xmlns:a16="http://schemas.microsoft.com/office/drawing/2014/main" id="{7019342C-89B8-7E58-FA7F-DA8032728785}"/>
+              </a:ext>
+            </a:extLst>
+          </p:cNvPr>
+          <p:cNvSpPr/>
+          <p:nvPr/>
+        </p:nvSpPr>
+        <p:spPr>
+          <a:xfrm>
+            <a:off x="8360228" y="2318657"/>
+            <a:ext cx="936172" cy="947057"/>
+          </a:xfrm>
+          <a:prstGeom prst="ellipse">
+            <a:avLst/>
+          </a:prstGeom>
+        </p:spPr>
+        <p:style>
+          <a:lnRef idx="2">
+            <a:schemeClr val="accent1">
+              <a:shade val="15000"/>
+            </a:schemeClr>
+          </a:lnRef>
+          <a:fillRef idx="1">
+            <a:schemeClr val="accent1"/>
+          </a:fillRef>
+          <a:effectRef idx="0">
+            <a:schemeClr val="accent1"/>
+          </a:effectRef>
+          <a:fontRef idx="minor">
+            <a:schemeClr val="lt1"/>
+          </a:fontRef>
+        </p:style>
+        <p:txBody>
+          <a:bodyPr rtlCol="0" anchor="ctr"/>
+          <a:lstStyle/>
+          <a:p>
+            <a:pPr algn="ctr"/>
+            <a:r>
+              <a:rPr lang="en-US" dirty="0"/>
+              <a:t>A</a:t>
+            </a:r>
+          </a:p>
+        </p:txBody>
+      </p:sp>
+      <p:sp>
+        <p:nvSpPr>
+          <p:cNvPr id="5" name="Oval 4">
+            <a:extLst>
+              <a:ext uri="{FF2B5EF4-FFF2-40B4-BE49-F238E27FC236}">
+                <a16:creationId xmlns:a16="http://schemas.microsoft.com/office/drawing/2014/main" id="{644CCBB3-E2BF-D335-020A-926E59C79E19}"/>
+              </a:ext>
+            </a:extLst>
+          </p:cNvPr>
+          <p:cNvSpPr/>
+          <p:nvPr/>
+        </p:nvSpPr>
+        <p:spPr>
+          <a:xfrm>
+            <a:off x="10123715" y="4419599"/>
+            <a:ext cx="936172" cy="947057"/>
+          </a:xfrm>
+          <a:prstGeom prst="ellipse">
+            <a:avLst/>
+          </a:prstGeom>
+        </p:spPr>
+        <p:style>
+          <a:lnRef idx="2">
+            <a:schemeClr val="accent1">
+              <a:shade val="15000"/>
+            </a:schemeClr>
+          </a:lnRef>
+          <a:fillRef idx="1">
+            <a:schemeClr val="accent1"/>
+          </a:fillRef>
+          <a:effectRef idx="0">
+            <a:schemeClr val="accent1"/>
+          </a:effectRef>
+          <a:fontRef idx="minor">
+            <a:schemeClr val="lt1"/>
+          </a:fontRef>
+        </p:style>
+        <p:txBody>
+          <a:bodyPr rtlCol="0" anchor="ctr"/>
+          <a:lstStyle/>
+          <a:p>
+            <a:pPr algn="ctr"/>
+            <a:r>
+              <a:rPr lang="en-US" dirty="0"/>
+              <a:t>C</a:t>
+            </a:r>
+          </a:p>
+        </p:txBody>
+      </p:sp>
+      <p:sp>
+        <p:nvSpPr>
+          <p:cNvPr id="6" name="Oval 5">
+            <a:extLst>
+              <a:ext uri="{FF2B5EF4-FFF2-40B4-BE49-F238E27FC236}">
+                <a16:creationId xmlns:a16="http://schemas.microsoft.com/office/drawing/2014/main" id="{640FA284-095A-A361-3DEF-CD1BCD97F644}"/>
+              </a:ext>
+            </a:extLst>
+          </p:cNvPr>
+          <p:cNvSpPr/>
+          <p:nvPr/>
+        </p:nvSpPr>
+        <p:spPr>
+          <a:xfrm>
+            <a:off x="6596742" y="4419599"/>
+            <a:ext cx="936172" cy="947057"/>
+          </a:xfrm>
+          <a:prstGeom prst="ellipse">
+            <a:avLst/>
+          </a:prstGeom>
+        </p:spPr>
+        <p:style>
+          <a:lnRef idx="2">
+            <a:schemeClr val="accent1">
+              <a:shade val="15000"/>
+            </a:schemeClr>
+          </a:lnRef>
+          <a:fillRef idx="1">
+            <a:schemeClr val="accent1"/>
+          </a:fillRef>
+          <a:effectRef idx="0">
+            <a:schemeClr val="accent1"/>
+          </a:effectRef>
+          <a:fontRef idx="minor">
+            <a:schemeClr val="lt1"/>
+          </a:fontRef>
+        </p:style>
+        <p:txBody>
+          <a:bodyPr rtlCol="0" anchor="ctr"/>
+          <a:lstStyle/>
+          <a:p>
+            <a:pPr algn="ctr"/>
+            <a:r>
+              <a:rPr lang="en-US" dirty="0"/>
+              <a:t>B</a:t>
+            </a:r>
+          </a:p>
+        </p:txBody>
+      </p:sp>
+      <p:cxnSp>
+        <p:nvCxnSpPr>
+          <p:cNvPr id="8" name="Straight Arrow Connector 7">
+            <a:extLst>
+              <a:ext uri="{FF2B5EF4-FFF2-40B4-BE49-F238E27FC236}">
+                <a16:creationId xmlns:a16="http://schemas.microsoft.com/office/drawing/2014/main" id="{50CC66AC-B45D-C708-08FF-F5C7DE178773}"/>
+              </a:ext>
+            </a:extLst>
+          </p:cNvPr>
+          <p:cNvCxnSpPr>
+            <a:stCxn id="4" idx="3"/>
+            <a:endCxn id="6" idx="7"/>
+          </p:cNvCxnSpPr>
+          <p:nvPr/>
+        </p:nvCxnSpPr>
+        <p:spPr>
+          <a:xfrm flipH="1">
+            <a:off x="7395815" y="3127021"/>
+            <a:ext cx="1101512" cy="1431271"/>
+          </a:xfrm>
+          <a:prstGeom prst="straightConnector1">
+            <a:avLst/>
+          </a:prstGeom>
+          <a:ln w="19050">
+            <a:tailEnd type="triangle"/>
+          </a:ln>
+        </p:spPr>
+        <p:style>
+          <a:lnRef idx="1">
+            <a:schemeClr val="accent1"/>
+          </a:lnRef>
+          <a:fillRef idx="0">
+            <a:schemeClr val="accent1"/>
+          </a:fillRef>
+          <a:effectRef idx="0">
+            <a:schemeClr val="accent1"/>
+          </a:effectRef>
+          <a:fontRef idx="minor">
+            <a:schemeClr val="tx1"/>
+          </a:fontRef>
+        </p:style>
+      </p:cxnSp>
+      <p:cxnSp>
+        <p:nvCxnSpPr>
+          <p:cNvPr id="14" name="Straight Arrow Connector 13">
+            <a:extLst>
+              <a:ext uri="{FF2B5EF4-FFF2-40B4-BE49-F238E27FC236}">
+                <a16:creationId xmlns:a16="http://schemas.microsoft.com/office/drawing/2014/main" id="{8B74DB2B-1E91-F4AE-1515-5AF4970FAC65}"/>
+              </a:ext>
+            </a:extLst>
+          </p:cNvPr>
+          <p:cNvCxnSpPr>
+            <a:stCxn id="6" idx="6"/>
+            <a:endCxn id="5" idx="2"/>
+          </p:cNvCxnSpPr>
+          <p:nvPr/>
+        </p:nvCxnSpPr>
+        <p:spPr>
+          <a:xfrm>
+            <a:off x="7532914" y="4893128"/>
+            <a:ext cx="2590801" cy="0"/>
+          </a:xfrm>
+          <a:prstGeom prst="straightConnector1">
+            <a:avLst/>
+          </a:prstGeom>
+          <a:ln w="19050">
+            <a:tailEnd type="triangle"/>
+          </a:ln>
+        </p:spPr>
+        <p:style>
+          <a:lnRef idx="1">
+            <a:schemeClr val="accent1"/>
+          </a:lnRef>
+          <a:fillRef idx="0">
+            <a:schemeClr val="accent1"/>
+          </a:fillRef>
+          <a:effectRef idx="0">
+            <a:schemeClr val="accent1"/>
+          </a:effectRef>
+          <a:fontRef idx="minor">
+            <a:schemeClr val="tx1"/>
+          </a:fontRef>
+        </p:style>
+      </p:cxnSp>
+      <p:cxnSp>
+        <p:nvCxnSpPr>
+          <p:cNvPr id="16" name="Straight Arrow Connector 15">
+            <a:extLst>
+              <a:ext uri="{FF2B5EF4-FFF2-40B4-BE49-F238E27FC236}">
+                <a16:creationId xmlns:a16="http://schemas.microsoft.com/office/drawing/2014/main" id="{74B75D2E-AD38-9AE9-52AB-062FD21E139E}"/>
+              </a:ext>
+            </a:extLst>
+          </p:cNvPr>
+          <p:cNvCxnSpPr>
+            <a:stCxn id="5" idx="1"/>
+            <a:endCxn id="4" idx="5"/>
+          </p:cNvCxnSpPr>
+          <p:nvPr/>
+        </p:nvCxnSpPr>
+        <p:spPr>
+          <a:xfrm flipH="1" flipV="1">
+            <a:off x="9159301" y="3127021"/>
+            <a:ext cx="1101513" cy="1431271"/>
+          </a:xfrm>
+          <a:prstGeom prst="straightConnector1">
+            <a:avLst/>
+          </a:prstGeom>
+          <a:ln w="19050">
+            <a:tailEnd type="triangle"/>
+          </a:ln>
+        </p:spPr>
+        <p:style>
+          <a:lnRef idx="1">
+            <a:schemeClr val="accent1"/>
+          </a:lnRef>
+          <a:fillRef idx="0">
+            <a:schemeClr val="accent1"/>
+          </a:fillRef>
+          <a:effectRef idx="0">
+            <a:schemeClr val="accent1"/>
+          </a:effectRef>
+          <a:fontRef idx="minor">
+            <a:schemeClr val="tx1"/>
+          </a:fontRef>
+        </p:style>
+      </p:cxnSp>
+      <p:sp>
+        <p:nvSpPr>
+          <p:cNvPr id="19" name="TextBox 18">
+            <a:extLst>
+              <a:ext uri="{FF2B5EF4-FFF2-40B4-BE49-F238E27FC236}">
+                <a16:creationId xmlns:a16="http://schemas.microsoft.com/office/drawing/2014/main" id="{59D86112-9AA2-9463-B48D-5F2AD1ABE9D8}"/>
+              </a:ext>
+            </a:extLst>
+          </p:cNvPr>
+          <p:cNvSpPr txBox="1"/>
+          <p:nvPr/>
+        </p:nvSpPr>
+        <p:spPr>
+          <a:xfrm>
+            <a:off x="10414509" y="2561352"/>
+            <a:ext cx="354584" cy="461665"/>
+          </a:xfrm>
+          <a:prstGeom prst="rect">
+            <a:avLst/>
+          </a:prstGeom>
+          <a:noFill/>
+        </p:spPr>
+        <p:txBody>
+          <a:bodyPr wrap="none" rtlCol="0">
+            <a:spAutoFit/>
+          </a:bodyPr>
+          <a:lstStyle/>
+          <a:p>
+            <a:r>
+              <a:rPr lang="en-US" sz="2400" dirty="0">
+                <a:latin typeface="Consolas" panose="020B0609020204030204" pitchFamily="49" charset="0"/>
+                <a:cs typeface="Consolas" panose="020B0609020204030204" pitchFamily="49" charset="0"/>
+              </a:rPr>
+              <a:t>p</a:t>
+            </a:r>
+          </a:p>
+        </p:txBody>
+      </p:sp>
+      <p:cxnSp>
+        <p:nvCxnSpPr>
+          <p:cNvPr id="21" name="Straight Arrow Connector 20">
+            <a:extLst>
+              <a:ext uri="{FF2B5EF4-FFF2-40B4-BE49-F238E27FC236}">
+                <a16:creationId xmlns:a16="http://schemas.microsoft.com/office/drawing/2014/main" id="{9CF76276-465A-3436-DE26-21281BFE2B8A}"/>
+              </a:ext>
+            </a:extLst>
+          </p:cNvPr>
+          <p:cNvCxnSpPr>
+            <a:stCxn id="19" idx="1"/>
+            <a:endCxn id="4" idx="6"/>
+          </p:cNvCxnSpPr>
+          <p:nvPr/>
+        </p:nvCxnSpPr>
+        <p:spPr>
+          <a:xfrm flipH="1">
+            <a:off x="9296400" y="2792185"/>
+            <a:ext cx="1118109" cy="1"/>
+          </a:xfrm>
+          <a:prstGeom prst="straightConnector1">
+            <a:avLst/>
+          </a:prstGeom>
+          <a:ln>
+            <a:tailEnd type="triangle"/>
+          </a:ln>
+        </p:spPr>
+        <p:style>
+          <a:lnRef idx="1">
+            <a:schemeClr val="accent1"/>
+          </a:lnRef>
+          <a:fillRef idx="0">
+            <a:schemeClr val="accent1"/>
+          </a:fillRef>
+          <a:effectRef idx="0">
+            <a:schemeClr val="accent1"/>
+          </a:effectRef>
+          <a:fontRef idx="minor">
+            <a:schemeClr val="tx1"/>
+          </a:fontRef>
+        </p:style>
+      </p:cxnSp>
     </p:spTree>
     <p:extLst>
       <p:ext uri="{BB962C8B-B14F-4D97-AF65-F5344CB8AC3E}">
         <p14:creationId xmlns:p14="http://schemas.microsoft.com/office/powerpoint/2010/main" val="1438740513"/>
+      </p:ext>
+    </p:extLst>
+  </p:cSld>
+  <p:clrMapOvr>
+    <a:masterClrMapping/>
+  </p:clrMapOvr>
+</p:sld>
+</file>
+
+<file path=ppt/slides/slide19.xml><?xml version="1.0" encoding="utf-8"?>
+<p:sld xmlns:a="http://schemas.openxmlformats.org/drawingml/2006/main" xmlns:r="http://schemas.openxmlformats.org/officeDocument/2006/relationships" xmlns:p="http://schemas.openxmlformats.org/presentationml/2006/main">
+  <p:cSld>
+    <p:spTree>
+      <p:nvGrpSpPr>
+        <p:cNvPr id="1" name=""/>
+        <p:cNvGrpSpPr/>
+        <p:nvPr/>
+      </p:nvGrpSpPr>
+      <p:grpSpPr>
+        <a:xfrm>
+          <a:off x="0" y="0"/>
+          <a:ext cx="0" cy="0"/>
+          <a:chOff x="0" y="0"/>
+          <a:chExt cx="0" cy="0"/>
+        </a:xfrm>
+      </p:grpSpPr>
+      <p:sp>
+        <p:nvSpPr>
+          <p:cNvPr id="2" name="Title 1">
+            <a:extLst>
+              <a:ext uri="{FF2B5EF4-FFF2-40B4-BE49-F238E27FC236}">
+                <a16:creationId xmlns:a16="http://schemas.microsoft.com/office/drawing/2014/main" id="{F6F0C058-F49A-2777-D9D5-10DDC8C3D876}"/>
+              </a:ext>
+            </a:extLst>
+          </p:cNvPr>
+          <p:cNvSpPr>
+            <a:spLocks noGrp="1"/>
+          </p:cNvSpPr>
+          <p:nvPr>
+            <p:ph type="title"/>
+          </p:nvPr>
+        </p:nvSpPr>
+        <p:spPr/>
+        <p:txBody>
+          <a:bodyPr/>
+          <a:lstStyle/>
+          <a:p>
+            <a:r>
+              <a:rPr lang="en-US" dirty="0"/>
+              <a:t>Weak Pointers</a:t>
+            </a:r>
+          </a:p>
+        </p:txBody>
+      </p:sp>
+      <p:sp>
+        <p:nvSpPr>
+          <p:cNvPr id="17" name="Content Placeholder 16">
+            <a:extLst>
+              <a:ext uri="{FF2B5EF4-FFF2-40B4-BE49-F238E27FC236}">
+                <a16:creationId xmlns:a16="http://schemas.microsoft.com/office/drawing/2014/main" id="{E1344596-47A0-9428-8B10-9972458FDE95}"/>
+              </a:ext>
+            </a:extLst>
+          </p:cNvPr>
+          <p:cNvSpPr>
+            <a:spLocks noGrp="1"/>
+          </p:cNvSpPr>
+          <p:nvPr>
+            <p:ph sz="half" idx="1"/>
+          </p:nvPr>
+        </p:nvSpPr>
+        <p:spPr/>
+        <p:txBody>
+          <a:bodyPr/>
+          <a:lstStyle/>
+          <a:p>
+            <a:r>
+              <a:rPr lang="en-US" dirty="0"/>
+              <a:t>Replace the pointer in C with a </a:t>
+            </a:r>
+            <a:r>
+              <a:rPr lang="en-US" dirty="0">
+                <a:latin typeface="Consolas" panose="020B0609020204030204" pitchFamily="49" charset="0"/>
+                <a:cs typeface="Consolas" panose="020B0609020204030204" pitchFamily="49" charset="0"/>
+              </a:rPr>
+              <a:t>std::</a:t>
+            </a:r>
+            <a:r>
+              <a:rPr lang="en-US" dirty="0" err="1">
+                <a:latin typeface="Consolas" panose="020B0609020204030204" pitchFamily="49" charset="0"/>
+                <a:cs typeface="Consolas" panose="020B0609020204030204" pitchFamily="49" charset="0"/>
+              </a:rPr>
+              <a:t>weak_ptr</a:t>
+            </a:r>
+            <a:r>
+              <a:rPr lang="en-US" dirty="0"/>
+              <a:t> </a:t>
+            </a:r>
+          </a:p>
+          <a:p>
+            <a:pPr lvl="1"/>
+            <a:r>
+              <a:rPr lang="en-US" dirty="0"/>
+              <a:t>Weak pointers don’t “own” the object to which they point and won’t delete it when they are destroyed</a:t>
+            </a:r>
+          </a:p>
+          <a:p>
+            <a:pPr lvl="1"/>
+            <a:r>
+              <a:rPr lang="en-US" dirty="0"/>
+              <a:t>This avoids a double delete of A</a:t>
+            </a:r>
+          </a:p>
+          <a:p>
+            <a:r>
+              <a:rPr lang="en-US" u="sng" dirty="0"/>
+              <a:t>Destroying </a:t>
+            </a:r>
+            <a:r>
+              <a:rPr lang="en-US" u="sng" dirty="0">
+                <a:latin typeface="Consolas" panose="020B0609020204030204" pitchFamily="49" charset="0"/>
+                <a:cs typeface="Consolas" panose="020B0609020204030204" pitchFamily="49" charset="0"/>
+              </a:rPr>
+              <a:t>p</a:t>
+            </a:r>
+            <a:r>
+              <a:rPr lang="en-US" u="sng" dirty="0"/>
+              <a:t> triggers removal of A, B, and C</a:t>
+            </a:r>
+          </a:p>
+        </p:txBody>
+      </p:sp>
+      <p:sp>
+        <p:nvSpPr>
+          <p:cNvPr id="18" name="Content Placeholder 17">
+            <a:extLst>
+              <a:ext uri="{FF2B5EF4-FFF2-40B4-BE49-F238E27FC236}">
+                <a16:creationId xmlns:a16="http://schemas.microsoft.com/office/drawing/2014/main" id="{88F03681-B7E9-E887-3189-293FADE08D4A}"/>
+              </a:ext>
+            </a:extLst>
+          </p:cNvPr>
+          <p:cNvSpPr>
+            <a:spLocks noGrp="1"/>
+          </p:cNvSpPr>
+          <p:nvPr>
+            <p:ph sz="half" idx="2"/>
+          </p:nvPr>
+        </p:nvSpPr>
+        <p:spPr/>
+        <p:txBody>
+          <a:bodyPr/>
+          <a:lstStyle/>
+          <a:p>
+            <a:endParaRPr lang="en-US" dirty="0"/>
+          </a:p>
+        </p:txBody>
+      </p:sp>
+      <p:sp>
+        <p:nvSpPr>
+          <p:cNvPr id="4" name="Oval 3">
+            <a:extLst>
+              <a:ext uri="{FF2B5EF4-FFF2-40B4-BE49-F238E27FC236}">
+                <a16:creationId xmlns:a16="http://schemas.microsoft.com/office/drawing/2014/main" id="{7019342C-89B8-7E58-FA7F-DA8032728785}"/>
+              </a:ext>
+            </a:extLst>
+          </p:cNvPr>
+          <p:cNvSpPr/>
+          <p:nvPr/>
+        </p:nvSpPr>
+        <p:spPr>
+          <a:xfrm>
+            <a:off x="8360228" y="2318657"/>
+            <a:ext cx="936172" cy="947057"/>
+          </a:xfrm>
+          <a:prstGeom prst="ellipse">
+            <a:avLst/>
+          </a:prstGeom>
+        </p:spPr>
+        <p:style>
+          <a:lnRef idx="2">
+            <a:schemeClr val="accent1">
+              <a:shade val="15000"/>
+            </a:schemeClr>
+          </a:lnRef>
+          <a:fillRef idx="1">
+            <a:schemeClr val="accent1"/>
+          </a:fillRef>
+          <a:effectRef idx="0">
+            <a:schemeClr val="accent1"/>
+          </a:effectRef>
+          <a:fontRef idx="minor">
+            <a:schemeClr val="lt1"/>
+          </a:fontRef>
+        </p:style>
+        <p:txBody>
+          <a:bodyPr rtlCol="0" anchor="ctr"/>
+          <a:lstStyle/>
+          <a:p>
+            <a:pPr algn="ctr"/>
+            <a:r>
+              <a:rPr lang="en-US" dirty="0"/>
+              <a:t>A</a:t>
+            </a:r>
+          </a:p>
+        </p:txBody>
+      </p:sp>
+      <p:sp>
+        <p:nvSpPr>
+          <p:cNvPr id="5" name="Oval 4">
+            <a:extLst>
+              <a:ext uri="{FF2B5EF4-FFF2-40B4-BE49-F238E27FC236}">
+                <a16:creationId xmlns:a16="http://schemas.microsoft.com/office/drawing/2014/main" id="{644CCBB3-E2BF-D335-020A-926E59C79E19}"/>
+              </a:ext>
+            </a:extLst>
+          </p:cNvPr>
+          <p:cNvSpPr/>
+          <p:nvPr/>
+        </p:nvSpPr>
+        <p:spPr>
+          <a:xfrm>
+            <a:off x="10123715" y="4419599"/>
+            <a:ext cx="936172" cy="947057"/>
+          </a:xfrm>
+          <a:prstGeom prst="ellipse">
+            <a:avLst/>
+          </a:prstGeom>
+        </p:spPr>
+        <p:style>
+          <a:lnRef idx="2">
+            <a:schemeClr val="accent1">
+              <a:shade val="15000"/>
+            </a:schemeClr>
+          </a:lnRef>
+          <a:fillRef idx="1">
+            <a:schemeClr val="accent1"/>
+          </a:fillRef>
+          <a:effectRef idx="0">
+            <a:schemeClr val="accent1"/>
+          </a:effectRef>
+          <a:fontRef idx="minor">
+            <a:schemeClr val="lt1"/>
+          </a:fontRef>
+        </p:style>
+        <p:txBody>
+          <a:bodyPr rtlCol="0" anchor="ctr"/>
+          <a:lstStyle/>
+          <a:p>
+            <a:pPr algn="ctr"/>
+            <a:r>
+              <a:rPr lang="en-US" dirty="0"/>
+              <a:t>C</a:t>
+            </a:r>
+          </a:p>
+        </p:txBody>
+      </p:sp>
+      <p:sp>
+        <p:nvSpPr>
+          <p:cNvPr id="6" name="Oval 5">
+            <a:extLst>
+              <a:ext uri="{FF2B5EF4-FFF2-40B4-BE49-F238E27FC236}">
+                <a16:creationId xmlns:a16="http://schemas.microsoft.com/office/drawing/2014/main" id="{640FA284-095A-A361-3DEF-CD1BCD97F644}"/>
+              </a:ext>
+            </a:extLst>
+          </p:cNvPr>
+          <p:cNvSpPr/>
+          <p:nvPr/>
+        </p:nvSpPr>
+        <p:spPr>
+          <a:xfrm>
+            <a:off x="6596742" y="4419599"/>
+            <a:ext cx="936172" cy="947057"/>
+          </a:xfrm>
+          <a:prstGeom prst="ellipse">
+            <a:avLst/>
+          </a:prstGeom>
+        </p:spPr>
+        <p:style>
+          <a:lnRef idx="2">
+            <a:schemeClr val="accent1">
+              <a:shade val="15000"/>
+            </a:schemeClr>
+          </a:lnRef>
+          <a:fillRef idx="1">
+            <a:schemeClr val="accent1"/>
+          </a:fillRef>
+          <a:effectRef idx="0">
+            <a:schemeClr val="accent1"/>
+          </a:effectRef>
+          <a:fontRef idx="minor">
+            <a:schemeClr val="lt1"/>
+          </a:fontRef>
+        </p:style>
+        <p:txBody>
+          <a:bodyPr rtlCol="0" anchor="ctr"/>
+          <a:lstStyle/>
+          <a:p>
+            <a:pPr algn="ctr"/>
+            <a:r>
+              <a:rPr lang="en-US" dirty="0"/>
+              <a:t>B</a:t>
+            </a:r>
+          </a:p>
+        </p:txBody>
+      </p:sp>
+      <p:cxnSp>
+        <p:nvCxnSpPr>
+          <p:cNvPr id="8" name="Straight Arrow Connector 7">
+            <a:extLst>
+              <a:ext uri="{FF2B5EF4-FFF2-40B4-BE49-F238E27FC236}">
+                <a16:creationId xmlns:a16="http://schemas.microsoft.com/office/drawing/2014/main" id="{50CC66AC-B45D-C708-08FF-F5C7DE178773}"/>
+              </a:ext>
+            </a:extLst>
+          </p:cNvPr>
+          <p:cNvCxnSpPr>
+            <a:stCxn id="4" idx="3"/>
+            <a:endCxn id="6" idx="7"/>
+          </p:cNvCxnSpPr>
+          <p:nvPr/>
+        </p:nvCxnSpPr>
+        <p:spPr>
+          <a:xfrm flipH="1">
+            <a:off x="7395815" y="3127021"/>
+            <a:ext cx="1101512" cy="1431271"/>
+          </a:xfrm>
+          <a:prstGeom prst="straightConnector1">
+            <a:avLst/>
+          </a:prstGeom>
+          <a:ln w="19050">
+            <a:tailEnd type="triangle"/>
+          </a:ln>
+        </p:spPr>
+        <p:style>
+          <a:lnRef idx="1">
+            <a:schemeClr val="accent1"/>
+          </a:lnRef>
+          <a:fillRef idx="0">
+            <a:schemeClr val="accent1"/>
+          </a:fillRef>
+          <a:effectRef idx="0">
+            <a:schemeClr val="accent1"/>
+          </a:effectRef>
+          <a:fontRef idx="minor">
+            <a:schemeClr val="tx1"/>
+          </a:fontRef>
+        </p:style>
+      </p:cxnSp>
+      <p:cxnSp>
+        <p:nvCxnSpPr>
+          <p:cNvPr id="14" name="Straight Arrow Connector 13">
+            <a:extLst>
+              <a:ext uri="{FF2B5EF4-FFF2-40B4-BE49-F238E27FC236}">
+                <a16:creationId xmlns:a16="http://schemas.microsoft.com/office/drawing/2014/main" id="{8B74DB2B-1E91-F4AE-1515-5AF4970FAC65}"/>
+              </a:ext>
+            </a:extLst>
+          </p:cNvPr>
+          <p:cNvCxnSpPr>
+            <a:stCxn id="6" idx="6"/>
+            <a:endCxn id="5" idx="2"/>
+          </p:cNvCxnSpPr>
+          <p:nvPr/>
+        </p:nvCxnSpPr>
+        <p:spPr>
+          <a:xfrm>
+            <a:off x="7532914" y="4893128"/>
+            <a:ext cx="2590801" cy="0"/>
+          </a:xfrm>
+          <a:prstGeom prst="straightConnector1">
+            <a:avLst/>
+          </a:prstGeom>
+          <a:ln w="19050">
+            <a:tailEnd type="triangle"/>
+          </a:ln>
+        </p:spPr>
+        <p:style>
+          <a:lnRef idx="1">
+            <a:schemeClr val="accent1"/>
+          </a:lnRef>
+          <a:fillRef idx="0">
+            <a:schemeClr val="accent1"/>
+          </a:fillRef>
+          <a:effectRef idx="0">
+            <a:schemeClr val="accent1"/>
+          </a:effectRef>
+          <a:fontRef idx="minor">
+            <a:schemeClr val="tx1"/>
+          </a:fontRef>
+        </p:style>
+      </p:cxnSp>
+      <p:cxnSp>
+        <p:nvCxnSpPr>
+          <p:cNvPr id="16" name="Straight Arrow Connector 15">
+            <a:extLst>
+              <a:ext uri="{FF2B5EF4-FFF2-40B4-BE49-F238E27FC236}">
+                <a16:creationId xmlns:a16="http://schemas.microsoft.com/office/drawing/2014/main" id="{74B75D2E-AD38-9AE9-52AB-062FD21E139E}"/>
+              </a:ext>
+            </a:extLst>
+          </p:cNvPr>
+          <p:cNvCxnSpPr>
+            <a:stCxn id="5" idx="1"/>
+            <a:endCxn id="4" idx="5"/>
+          </p:cNvCxnSpPr>
+          <p:nvPr/>
+        </p:nvCxnSpPr>
+        <p:spPr>
+          <a:xfrm flipH="1" flipV="1">
+            <a:off x="9159301" y="3127021"/>
+            <a:ext cx="1101513" cy="1431271"/>
+          </a:xfrm>
+          <a:prstGeom prst="straightConnector1">
+            <a:avLst/>
+          </a:prstGeom>
+          <a:ln w="19050">
+            <a:prstDash val="lgDash"/>
+            <a:tailEnd type="triangle"/>
+          </a:ln>
+        </p:spPr>
+        <p:style>
+          <a:lnRef idx="1">
+            <a:schemeClr val="accent1"/>
+          </a:lnRef>
+          <a:fillRef idx="0">
+            <a:schemeClr val="accent1"/>
+          </a:fillRef>
+          <a:effectRef idx="0">
+            <a:schemeClr val="accent1"/>
+          </a:effectRef>
+          <a:fontRef idx="minor">
+            <a:schemeClr val="tx1"/>
+          </a:fontRef>
+        </p:style>
+      </p:cxnSp>
+      <p:sp>
+        <p:nvSpPr>
+          <p:cNvPr id="19" name="TextBox 18">
+            <a:extLst>
+              <a:ext uri="{FF2B5EF4-FFF2-40B4-BE49-F238E27FC236}">
+                <a16:creationId xmlns:a16="http://schemas.microsoft.com/office/drawing/2014/main" id="{59D86112-9AA2-9463-B48D-5F2AD1ABE9D8}"/>
+              </a:ext>
+            </a:extLst>
+          </p:cNvPr>
+          <p:cNvSpPr txBox="1"/>
+          <p:nvPr/>
+        </p:nvSpPr>
+        <p:spPr>
+          <a:xfrm>
+            <a:off x="10414509" y="2561352"/>
+            <a:ext cx="354584" cy="461665"/>
+          </a:xfrm>
+          <a:prstGeom prst="rect">
+            <a:avLst/>
+          </a:prstGeom>
+          <a:noFill/>
+        </p:spPr>
+        <p:txBody>
+          <a:bodyPr wrap="none" rtlCol="0">
+            <a:spAutoFit/>
+          </a:bodyPr>
+          <a:lstStyle/>
+          <a:p>
+            <a:r>
+              <a:rPr lang="en-US" sz="2400" dirty="0">
+                <a:latin typeface="Consolas" panose="020B0609020204030204" pitchFamily="49" charset="0"/>
+                <a:cs typeface="Consolas" panose="020B0609020204030204" pitchFamily="49" charset="0"/>
+              </a:rPr>
+              <a:t>p</a:t>
+            </a:r>
+          </a:p>
+        </p:txBody>
+      </p:sp>
+      <p:cxnSp>
+        <p:nvCxnSpPr>
+          <p:cNvPr id="21" name="Straight Arrow Connector 20">
+            <a:extLst>
+              <a:ext uri="{FF2B5EF4-FFF2-40B4-BE49-F238E27FC236}">
+                <a16:creationId xmlns:a16="http://schemas.microsoft.com/office/drawing/2014/main" id="{9CF76276-465A-3436-DE26-21281BFE2B8A}"/>
+              </a:ext>
+            </a:extLst>
+          </p:cNvPr>
+          <p:cNvCxnSpPr>
+            <a:stCxn id="19" idx="1"/>
+            <a:endCxn id="4" idx="6"/>
+          </p:cNvCxnSpPr>
+          <p:nvPr/>
+        </p:nvCxnSpPr>
+        <p:spPr>
+          <a:xfrm flipH="1">
+            <a:off x="9296400" y="2792185"/>
+            <a:ext cx="1118109" cy="1"/>
+          </a:xfrm>
+          <a:prstGeom prst="straightConnector1">
+            <a:avLst/>
+          </a:prstGeom>
+          <a:ln>
+            <a:tailEnd type="triangle"/>
+          </a:ln>
+        </p:spPr>
+        <p:style>
+          <a:lnRef idx="1">
+            <a:schemeClr val="accent1"/>
+          </a:lnRef>
+          <a:fillRef idx="0">
+            <a:schemeClr val="accent1"/>
+          </a:fillRef>
+          <a:effectRef idx="0">
+            <a:schemeClr val="accent1"/>
+          </a:effectRef>
+          <a:fontRef idx="minor">
+            <a:schemeClr val="tx1"/>
+          </a:fontRef>
+        </p:style>
+      </p:cxnSp>
+    </p:spTree>
+    <p:extLst>
+      <p:ext uri="{BB962C8B-B14F-4D97-AF65-F5344CB8AC3E}">
+        <p14:creationId xmlns:p14="http://schemas.microsoft.com/office/powerpoint/2010/main" val="3311740523"/>
       </p:ext>
     </p:extLst>
   </p:cSld>
@@ -5635,7 +6480,7 @@
             <a:pPr lvl="1"/>
             <a:r>
               <a:rPr lang="en-US" dirty="0"/>
-              <a:t>Essentially, they are integers by have a different type</a:t>
+              <a:t>Essentially, they are integers but have a different type</a:t>
             </a:r>
           </a:p>
         </p:txBody>
@@ -5772,6 +6617,337 @@
     <p:extLst>
       <p:ext uri="{BB962C8B-B14F-4D97-AF65-F5344CB8AC3E}">
         <p14:creationId xmlns:p14="http://schemas.microsoft.com/office/powerpoint/2010/main" val="818113633"/>
+      </p:ext>
+    </p:extLst>
+  </p:cSld>
+  <p:clrMapOvr>
+    <a:masterClrMapping/>
+  </p:clrMapOvr>
+</p:sld>
+</file>
+
+<file path=ppt/slides/slide20.xml><?xml version="1.0" encoding="utf-8"?>
+<p:sld xmlns:a="http://schemas.openxmlformats.org/drawingml/2006/main" xmlns:r="http://schemas.openxmlformats.org/officeDocument/2006/relationships" xmlns:p="http://schemas.openxmlformats.org/presentationml/2006/main">
+  <p:cSld>
+    <p:spTree>
+      <p:nvGrpSpPr>
+        <p:cNvPr id="1" name=""/>
+        <p:cNvGrpSpPr/>
+        <p:nvPr/>
+      </p:nvGrpSpPr>
+      <p:grpSpPr>
+        <a:xfrm>
+          <a:off x="0" y="0"/>
+          <a:ext cx="0" cy="0"/>
+          <a:chOff x="0" y="0"/>
+          <a:chExt cx="0" cy="0"/>
+        </a:xfrm>
+      </p:grpSpPr>
+      <p:sp>
+        <p:nvSpPr>
+          <p:cNvPr id="2" name="Title 1">
+            <a:extLst>
+              <a:ext uri="{FF2B5EF4-FFF2-40B4-BE49-F238E27FC236}">
+                <a16:creationId xmlns:a16="http://schemas.microsoft.com/office/drawing/2014/main" id="{B82D5F2A-A500-F0FB-310B-8317B8CA4797}"/>
+              </a:ext>
+            </a:extLst>
+          </p:cNvPr>
+          <p:cNvSpPr>
+            <a:spLocks noGrp="1"/>
+          </p:cNvSpPr>
+          <p:nvPr>
+            <p:ph type="title"/>
+          </p:nvPr>
+        </p:nvSpPr>
+        <p:spPr/>
+        <p:txBody>
+          <a:bodyPr/>
+          <a:lstStyle/>
+          <a:p>
+            <a:r>
+              <a:rPr lang="en-US" dirty="0"/>
+              <a:t>Weak Pointer Operations</a:t>
+            </a:r>
+          </a:p>
+        </p:txBody>
+      </p:sp>
+      <p:sp>
+        <p:nvSpPr>
+          <p:cNvPr id="3" name="Content Placeholder 2">
+            <a:extLst>
+              <a:ext uri="{FF2B5EF4-FFF2-40B4-BE49-F238E27FC236}">
+                <a16:creationId xmlns:a16="http://schemas.microsoft.com/office/drawing/2014/main" id="{37D5A4F9-42F6-76AC-2821-0FEC4F054188}"/>
+              </a:ext>
+            </a:extLst>
+          </p:cNvPr>
+          <p:cNvSpPr>
+            <a:spLocks noGrp="1"/>
+          </p:cNvSpPr>
+          <p:nvPr>
+            <p:ph idx="1"/>
+          </p:nvPr>
+        </p:nvSpPr>
+        <p:spPr/>
+        <p:txBody>
+          <a:bodyPr/>
+          <a:lstStyle/>
+          <a:p>
+            <a:r>
+              <a:rPr lang="en-US" dirty="0"/>
+              <a:t>Weak pointers have very few operations</a:t>
+            </a:r>
+          </a:p>
+          <a:p>
+            <a:pPr lvl="1"/>
+            <a:r>
+              <a:rPr lang="en-US" dirty="0"/>
+              <a:t>You cannot access the object to which they point (without first converting them into a </a:t>
+            </a:r>
+            <a:r>
+              <a:rPr lang="en-US" dirty="0">
+                <a:latin typeface="Consolas" panose="020B0609020204030204" pitchFamily="49" charset="0"/>
+                <a:cs typeface="Consolas" panose="020B0609020204030204" pitchFamily="49" charset="0"/>
+              </a:rPr>
+              <a:t>std::</a:t>
+            </a:r>
+            <a:r>
+              <a:rPr lang="en-US" dirty="0" err="1">
+                <a:latin typeface="Consolas" panose="020B0609020204030204" pitchFamily="49" charset="0"/>
+                <a:cs typeface="Consolas" panose="020B0609020204030204" pitchFamily="49" charset="0"/>
+              </a:rPr>
+              <a:t>shared_ptr</a:t>
+            </a:r>
+            <a:r>
+              <a:rPr lang="en-US" dirty="0"/>
+              <a:t>)</a:t>
+            </a:r>
+          </a:p>
+          <a:p>
+            <a:pPr lvl="1"/>
+            <a:r>
+              <a:rPr lang="en-US" dirty="0"/>
+              <a:t>This is surprising but makes sense… a </a:t>
+            </a:r>
+            <a:r>
+              <a:rPr lang="en-US" dirty="0">
+                <a:latin typeface="Consolas" panose="020B0609020204030204" pitchFamily="49" charset="0"/>
+                <a:cs typeface="Consolas" panose="020B0609020204030204" pitchFamily="49" charset="0"/>
+              </a:rPr>
+              <a:t>std::</a:t>
+            </a:r>
+            <a:r>
+              <a:rPr lang="en-US" dirty="0" err="1">
+                <a:latin typeface="Consolas" panose="020B0609020204030204" pitchFamily="49" charset="0"/>
+                <a:cs typeface="Consolas" panose="020B0609020204030204" pitchFamily="49" charset="0"/>
+              </a:rPr>
+              <a:t>weak_ptr</a:t>
+            </a:r>
+            <a:r>
+              <a:rPr lang="en-US" dirty="0"/>
+              <a:t> might not actual be pointing at something (it might have been deleted). In such a case we say the </a:t>
+            </a:r>
+            <a:r>
+              <a:rPr lang="en-US" dirty="0">
+                <a:latin typeface="Consolas" panose="020B0609020204030204" pitchFamily="49" charset="0"/>
+                <a:cs typeface="Consolas" panose="020B0609020204030204" pitchFamily="49" charset="0"/>
+              </a:rPr>
+              <a:t>std::</a:t>
+            </a:r>
+            <a:r>
+              <a:rPr lang="en-US" dirty="0" err="1">
+                <a:latin typeface="Consolas" panose="020B0609020204030204" pitchFamily="49" charset="0"/>
+                <a:cs typeface="Consolas" panose="020B0609020204030204" pitchFamily="49" charset="0"/>
+              </a:rPr>
+              <a:t>weak_ptr</a:t>
+            </a:r>
+            <a:r>
+              <a:rPr lang="en-US" dirty="0"/>
+              <a:t> has </a:t>
+            </a:r>
+            <a:r>
+              <a:rPr lang="en-US" i="1" dirty="0"/>
+              <a:t>expired</a:t>
+            </a:r>
+          </a:p>
+          <a:p>
+            <a:r>
+              <a:rPr lang="en-US" dirty="0"/>
+              <a:t>To convert a </a:t>
+            </a:r>
+            <a:r>
+              <a:rPr lang="en-US" dirty="0">
+                <a:latin typeface="Consolas" panose="020B0609020204030204" pitchFamily="49" charset="0"/>
+                <a:cs typeface="Consolas" panose="020B0609020204030204" pitchFamily="49" charset="0"/>
+              </a:rPr>
+              <a:t>std::</a:t>
+            </a:r>
+            <a:r>
+              <a:rPr lang="en-US" dirty="0" err="1">
+                <a:latin typeface="Consolas" panose="020B0609020204030204" pitchFamily="49" charset="0"/>
+                <a:cs typeface="Consolas" panose="020B0609020204030204" pitchFamily="49" charset="0"/>
+              </a:rPr>
+              <a:t>weak_ptr</a:t>
+            </a:r>
+            <a:r>
+              <a:rPr lang="en-US" dirty="0"/>
+              <a:t> to a </a:t>
+            </a:r>
+            <a:r>
+              <a:rPr lang="en-US" dirty="0">
+                <a:latin typeface="Consolas" panose="020B0609020204030204" pitchFamily="49" charset="0"/>
+                <a:cs typeface="Consolas" panose="020B0609020204030204" pitchFamily="49" charset="0"/>
+              </a:rPr>
+              <a:t>std::</a:t>
+            </a:r>
+            <a:r>
+              <a:rPr lang="en-US" dirty="0" err="1">
+                <a:latin typeface="Consolas" panose="020B0609020204030204" pitchFamily="49" charset="0"/>
+                <a:cs typeface="Consolas" panose="020B0609020204030204" pitchFamily="49" charset="0"/>
+              </a:rPr>
+              <a:t>shared_ptr</a:t>
+            </a:r>
+            <a:r>
+              <a:rPr lang="en-US" dirty="0"/>
+              <a:t>:</a:t>
+            </a:r>
+          </a:p>
+          <a:p>
+            <a:pPr lvl="1"/>
+            <a:r>
+              <a:rPr lang="en-US" dirty="0"/>
+              <a:t>Use the </a:t>
+            </a:r>
+            <a:r>
+              <a:rPr lang="en-US" dirty="0">
+                <a:latin typeface="Consolas" panose="020B0609020204030204" pitchFamily="49" charset="0"/>
+                <a:cs typeface="Consolas" panose="020B0609020204030204" pitchFamily="49" charset="0"/>
+              </a:rPr>
+              <a:t>lock</a:t>
+            </a:r>
+            <a:r>
+              <a:rPr lang="en-US" dirty="0"/>
+              <a:t> method (returns a shared pointer, which will be empty if the weak pointer is expired)</a:t>
+            </a:r>
+          </a:p>
+          <a:p>
+            <a:pPr lvl="1"/>
+            <a:r>
+              <a:rPr lang="en-US" dirty="0"/>
+              <a:t>Construct a shared pointer from the weak pointer (which throws an exception if the weak pointer is expired)</a:t>
+            </a:r>
+          </a:p>
+        </p:txBody>
+      </p:sp>
+    </p:spTree>
+    <p:extLst>
+      <p:ext uri="{BB962C8B-B14F-4D97-AF65-F5344CB8AC3E}">
+        <p14:creationId xmlns:p14="http://schemas.microsoft.com/office/powerpoint/2010/main" val="1416207087"/>
+      </p:ext>
+    </p:extLst>
+  </p:cSld>
+  <p:clrMapOvr>
+    <a:masterClrMapping/>
+  </p:clrMapOvr>
+</p:sld>
+</file>
+
+<file path=ppt/slides/slide21.xml><?xml version="1.0" encoding="utf-8"?>
+<p:sld xmlns:a="http://schemas.openxmlformats.org/drawingml/2006/main" xmlns:r="http://schemas.openxmlformats.org/officeDocument/2006/relationships" xmlns:p="http://schemas.openxmlformats.org/presentationml/2006/main">
+  <p:cSld>
+    <p:spTree>
+      <p:nvGrpSpPr>
+        <p:cNvPr id="1" name=""/>
+        <p:cNvGrpSpPr/>
+        <p:nvPr/>
+      </p:nvGrpSpPr>
+      <p:grpSpPr>
+        <a:xfrm>
+          <a:off x="0" y="0"/>
+          <a:ext cx="0" cy="0"/>
+          <a:chOff x="0" y="0"/>
+          <a:chExt cx="0" cy="0"/>
+        </a:xfrm>
+      </p:grpSpPr>
+      <p:sp>
+        <p:nvSpPr>
+          <p:cNvPr id="2" name="Title 1">
+            <a:extLst>
+              <a:ext uri="{FF2B5EF4-FFF2-40B4-BE49-F238E27FC236}">
+                <a16:creationId xmlns:a16="http://schemas.microsoft.com/office/drawing/2014/main" id="{AA770FE3-FD46-AB1E-917E-A0D4B617DA24}"/>
+              </a:ext>
+            </a:extLst>
+          </p:cNvPr>
+          <p:cNvSpPr>
+            <a:spLocks noGrp="1"/>
+          </p:cNvSpPr>
+          <p:nvPr>
+            <p:ph type="title"/>
+          </p:nvPr>
+        </p:nvSpPr>
+        <p:spPr/>
+        <p:txBody>
+          <a:bodyPr/>
+          <a:lstStyle/>
+          <a:p>
+            <a:r>
+              <a:rPr lang="en-US" dirty="0"/>
+              <a:t>Creating Weak Pointers</a:t>
+            </a:r>
+          </a:p>
+        </p:txBody>
+      </p:sp>
+      <p:sp>
+        <p:nvSpPr>
+          <p:cNvPr id="3" name="Content Placeholder 2">
+            <a:extLst>
+              <a:ext uri="{FF2B5EF4-FFF2-40B4-BE49-F238E27FC236}">
+                <a16:creationId xmlns:a16="http://schemas.microsoft.com/office/drawing/2014/main" id="{0754D640-6C64-8BA1-F65E-AF9E4CC0B235}"/>
+              </a:ext>
+            </a:extLst>
+          </p:cNvPr>
+          <p:cNvSpPr>
+            <a:spLocks noGrp="1"/>
+          </p:cNvSpPr>
+          <p:nvPr>
+            <p:ph idx="1"/>
+          </p:nvPr>
+        </p:nvSpPr>
+        <p:spPr/>
+        <p:txBody>
+          <a:bodyPr/>
+          <a:lstStyle/>
+          <a:p>
+            <a:r>
+              <a:rPr lang="en-US" dirty="0"/>
+              <a:t>Shared pointers can be converted into weak pointers implicitly…</a:t>
+            </a:r>
+          </a:p>
+          <a:p>
+            <a:pPr lvl="1"/>
+            <a:r>
+              <a:rPr lang="en-US" dirty="0"/>
+              <a:t>… by way of assignment to a weak pointer…</a:t>
+            </a:r>
+          </a:p>
+          <a:p>
+            <a:pPr lvl="1"/>
+            <a:r>
+              <a:rPr lang="en-US" dirty="0"/>
+              <a:t>… or constructing a weak pointer from a shared pointer</a:t>
+            </a:r>
+          </a:p>
+          <a:p>
+            <a:r>
+              <a:rPr lang="en-US" dirty="0"/>
+              <a:t>Shared pointers can be dereferenced like ordinary pointers (with the same operators), but weak pointers must be “locked” (i.e., converted to a shared pointer) before they can be used to access the target object</a:t>
+            </a:r>
+          </a:p>
+        </p:txBody>
+      </p:sp>
+    </p:spTree>
+    <p:extLst>
+      <p:ext uri="{BB962C8B-B14F-4D97-AF65-F5344CB8AC3E}">
+        <p14:creationId xmlns:p14="http://schemas.microsoft.com/office/powerpoint/2010/main" val="95244759"/>
       </p:ext>
     </p:extLst>
   </p:cSld>
@@ -5849,14 +7025,7 @@
           <a:p>
             <a:r>
               <a:rPr lang="en-US" dirty="0"/>
-              <a:t>Raw pointers are very error-prone to use.</a:t>
-            </a:r>
-          </a:p>
-          <a:p>
-            <a:pPr lvl="1"/>
-            <a:r>
-              <a:rPr lang="en-US" dirty="0"/>
-              <a:t>Two pointers can point at the same object unintentionally (changing the object through one pointer can affect what is seen through the other).</a:t>
+              <a:t>Raw pointers are very error-prone to use</a:t>
             </a:r>
           </a:p>
           <a:p>
@@ -5869,16 +7038,20 @@
               <a:rPr lang="en-US" baseline="30000" dirty="0"/>
               <a:t>*</a:t>
             </a:r>
-            <a:r>
-              <a:rPr lang="en-US" dirty="0"/>
-              <a:t>.</a:t>
-            </a:r>
+            <a:endParaRPr lang="en-US" dirty="0"/>
           </a:p>
           <a:p>
             <a:pPr lvl="1"/>
             <a:r>
               <a:rPr lang="en-US" dirty="0"/>
-              <a:t>Dynamic memory might never get deleted (memory leak), wasting space.</a:t>
+              <a:t>Dynamic memory might never get deleted (memory leak), wasting space</a:t>
+            </a:r>
+          </a:p>
+          <a:p>
+            <a:pPr lvl="1"/>
+            <a:r>
+              <a:rPr lang="en-US" dirty="0"/>
+              <a:t>Dynamic memory could be accessed after being deallocated (use-after-free), causing UB</a:t>
             </a:r>
           </a:p>
           <a:p>
@@ -6149,7 +7322,7 @@
             <a:pPr lvl="1"/>
             <a:r>
               <a:rPr lang="en-US" dirty="0"/>
-              <a:t>… but real-time garbage collection systems do exist</a:t>
+              <a:t>… although real-time garbage collection systems do exist</a:t>
             </a:r>
           </a:p>
           <a:p>
@@ -6162,7 +7335,7 @@
             <a:pPr lvl="1"/>
             <a:r>
               <a:rPr lang="en-US" dirty="0"/>
-              <a:t>This is an issue for highly constrained systems</a:t>
+              <a:t>… an issue for highly constrained systems</a:t>
             </a:r>
           </a:p>
         </p:txBody>
@@ -6298,7 +7471,13 @@
                 <a:latin typeface="Consolas" panose="020B0609020204030204" pitchFamily="49" charset="0"/>
                 <a:cs typeface="Consolas" panose="020B0609020204030204" pitchFamily="49" charset="0"/>
               </a:rPr>
-              <a:t> []</a:t>
+              <a:t> </a:t>
+            </a:r>
+            <a:r>
+              <a:rPr lang="en-US" dirty="0">
+                <a:cs typeface="Consolas" panose="020B0609020204030204" pitchFamily="49" charset="0"/>
+              </a:rPr>
+              <a:t>[] for arrays</a:t>
             </a:r>
             <a:r>
               <a:rPr lang="en-US" dirty="0"/>
@@ -6421,7 +7600,7 @@
           <a:p>
             <a:r>
               <a:rPr lang="en-US" dirty="0"/>
-              <a:t>C++ 2011 (and beyond) smart pointers help to address this.</a:t>
+              <a:t>C++ 2011 (and beyond) has smart pointers to help address this</a:t>
             </a:r>
           </a:p>
           <a:p>
@@ -6837,7 +8016,7 @@
           <p:cNvPr id="2" name="Title 1">
             <a:extLst>
               <a:ext uri="{FF2B5EF4-FFF2-40B4-BE49-F238E27FC236}">
-                <a16:creationId xmlns:a16="http://schemas.microsoft.com/office/drawing/2014/main" id="{266971D1-1CC6-6FFF-0470-11E5F7FB91D8}"/>
+                <a16:creationId xmlns:a16="http://schemas.microsoft.com/office/drawing/2014/main" id="{EA84CF85-588A-22F0-E308-8745647F5AB8}"/>
               </a:ext>
             </a:extLst>
           </p:cNvPr>
@@ -6855,7 +8034,7 @@
           <a:p>
             <a:r>
               <a:rPr lang="en-US" dirty="0"/>
-              <a:t>No Copying</a:t>
+              <a:t>Library Helper</a:t>
             </a:r>
           </a:p>
         </p:txBody>
@@ -6865,7 +8044,7 @@
           <p:cNvPr id="3" name="Content Placeholder 2">
             <a:extLst>
               <a:ext uri="{FF2B5EF4-FFF2-40B4-BE49-F238E27FC236}">
-                <a16:creationId xmlns:a16="http://schemas.microsoft.com/office/drawing/2014/main" id="{FFF03700-B5D7-2002-54C1-2AB5C5CD4F6D}"/>
+                <a16:creationId xmlns:a16="http://schemas.microsoft.com/office/drawing/2014/main" id="{EF537B4F-EB80-4375-B081-0414EE571820}"/>
               </a:ext>
             </a:extLst>
           </p:cNvPr>
@@ -6878,60 +8057,270 @@
         </p:nvSpPr>
         <p:spPr/>
         <p:txBody>
-          <a:bodyPr/>
-          <a:lstStyle/>
-          <a:p>
-            <a:r>
-              <a:rPr lang="en-US" dirty="0"/>
-              <a:t>Unique pointers cannot be copied!</a:t>
-            </a:r>
-          </a:p>
-          <a:p>
-            <a:pPr lvl="1"/>
-            <a:r>
-              <a:rPr lang="en-US" dirty="0"/>
-              <a:t>Doing so would result in two pointers that point at the same object, completely negating the point of unique pointers!</a:t>
-            </a:r>
-          </a:p>
-          <a:p>
-            <a:r>
-              <a:rPr lang="en-US" dirty="0"/>
-              <a:t>Isn’t that limiting?</a:t>
-            </a:r>
-          </a:p>
-          <a:p>
-            <a:pPr lvl="1"/>
-            <a:r>
-              <a:rPr lang="en-US" dirty="0"/>
-              <a:t>Yes, it is. However, we haven’t met shared pointers yet.</a:t>
-            </a:r>
-          </a:p>
-          <a:p>
-            <a:r>
-              <a:rPr lang="en-US" dirty="0"/>
-              <a:t>Unique pointers can, however, be </a:t>
-            </a:r>
-            <a:r>
-              <a:rPr lang="en-US" i="1" u="sng" dirty="0"/>
-              <a:t>moved</a:t>
-            </a:r>
-          </a:p>
-          <a:p>
-            <a:pPr lvl="1"/>
-            <a:r>
-              <a:rPr lang="en-US" dirty="0"/>
-              <a:t>Transfers ownership to the destination of the move</a:t>
-            </a:r>
-          </a:p>
-          <a:p>
-            <a:pPr lvl="1"/>
-            <a:r>
-              <a:rPr lang="en-US" dirty="0"/>
-              <a:t>The original owner no longer tries to delete the object. It is considered </a:t>
-            </a:r>
-            <a:r>
-              <a:rPr lang="en-US" i="1" dirty="0"/>
-              <a:t>empty</a:t>
+          <a:bodyPr>
+            <a:normAutofit/>
+          </a:bodyPr>
+          <a:lstStyle/>
+          <a:p>
+            <a:r>
+              <a:rPr lang="en-US" sz="2400" dirty="0"/>
+              <a:t>Starting with C++ 2014, the preferred way to create a </a:t>
+            </a:r>
+            <a:r>
+              <a:rPr lang="en-US" sz="2400" dirty="0" err="1">
+                <a:latin typeface="Consolas" panose="020B0609020204030204" pitchFamily="49" charset="0"/>
+                <a:cs typeface="Consolas" panose="020B0609020204030204" pitchFamily="49" charset="0"/>
+              </a:rPr>
+              <a:t>unique_ptr</a:t>
+            </a:r>
+            <a:r>
+              <a:rPr lang="en-US" sz="2400" dirty="0"/>
+              <a:t> is with the helper function template </a:t>
+            </a:r>
+            <a:r>
+              <a:rPr lang="en-US" sz="2400" dirty="0">
+                <a:latin typeface="Consolas" panose="020B0609020204030204" pitchFamily="49" charset="0"/>
+                <a:cs typeface="Consolas" panose="020B0609020204030204" pitchFamily="49" charset="0"/>
+              </a:rPr>
+              <a:t>std::</a:t>
+            </a:r>
+            <a:r>
+              <a:rPr lang="en-US" sz="2400" dirty="0" err="1">
+                <a:latin typeface="Consolas" panose="020B0609020204030204" pitchFamily="49" charset="0"/>
+                <a:cs typeface="Consolas" panose="020B0609020204030204" pitchFamily="49" charset="0"/>
+              </a:rPr>
+              <a:t>make_unique</a:t>
+            </a:r>
+            <a:br>
+              <a:rPr lang="en-US" sz="2400" dirty="0">
+                <a:latin typeface="Consolas" panose="020B0609020204030204" pitchFamily="49" charset="0"/>
+                <a:cs typeface="Consolas" panose="020B0609020204030204" pitchFamily="49" charset="0"/>
+              </a:rPr>
+            </a:br>
+            <a:br>
+              <a:rPr lang="en-US" dirty="0">
+                <a:cs typeface="Consolas" panose="020B0609020204030204" pitchFamily="49" charset="0"/>
+              </a:rPr>
+            </a:br>
+            <a:br>
+              <a:rPr lang="en-US" dirty="0">
+                <a:cs typeface="Consolas" panose="020B0609020204030204" pitchFamily="49" charset="0"/>
+              </a:rPr>
+            </a:br>
+            <a:br>
+              <a:rPr lang="en-US" dirty="0">
+                <a:cs typeface="Consolas" panose="020B0609020204030204" pitchFamily="49" charset="0"/>
+              </a:rPr>
+            </a:br>
+            <a:br>
+              <a:rPr lang="en-US" dirty="0">
+                <a:cs typeface="Consolas" panose="020B0609020204030204" pitchFamily="49" charset="0"/>
+              </a:rPr>
+            </a:br>
+            <a:br>
+              <a:rPr lang="en-US" dirty="0">
+                <a:cs typeface="Consolas" panose="020B0609020204030204" pitchFamily="49" charset="0"/>
+              </a:rPr>
+            </a:br>
+            <a:endParaRPr lang="en-US" dirty="0">
+              <a:cs typeface="Consolas" panose="020B0609020204030204" pitchFamily="49" charset="0"/>
+            </a:endParaRPr>
+          </a:p>
+          <a:p>
+            <a:r>
+              <a:rPr lang="en-US" sz="2400" dirty="0">
+                <a:cs typeface="Consolas" panose="020B0609020204030204" pitchFamily="49" charset="0"/>
+              </a:rPr>
+              <a:t>The ability of </a:t>
+            </a:r>
+            <a:r>
+              <a:rPr lang="en-US" sz="2400" dirty="0">
+                <a:latin typeface="Consolas" panose="020B0609020204030204" pitchFamily="49" charset="0"/>
+                <a:cs typeface="Consolas" panose="020B0609020204030204" pitchFamily="49" charset="0"/>
+              </a:rPr>
+              <a:t>std::</a:t>
+            </a:r>
+            <a:r>
+              <a:rPr lang="en-US" sz="2400" dirty="0" err="1">
+                <a:latin typeface="Consolas" panose="020B0609020204030204" pitchFamily="49" charset="0"/>
+                <a:cs typeface="Consolas" panose="020B0609020204030204" pitchFamily="49" charset="0"/>
+              </a:rPr>
+              <a:t>make_unique</a:t>
+            </a:r>
+            <a:r>
+              <a:rPr lang="en-US" sz="2400" dirty="0">
+                <a:cs typeface="Consolas" panose="020B0609020204030204" pitchFamily="49" charset="0"/>
+              </a:rPr>
+              <a:t> to take a variable number of parameters of various types is because of a C++ 2011 feature called variadic templates</a:t>
+            </a:r>
+            <a:br>
+              <a:rPr lang="en-US" dirty="0">
+                <a:cs typeface="Consolas" panose="020B0609020204030204" pitchFamily="49" charset="0"/>
+              </a:rPr>
+            </a:br>
+            <a:endParaRPr lang="en-US" dirty="0">
+              <a:cs typeface="Consolas" panose="020B0609020204030204" pitchFamily="49" charset="0"/>
+            </a:endParaRPr>
+          </a:p>
+          <a:p>
+            <a:endParaRPr lang="en-US" dirty="0">
+              <a:latin typeface="Consolas" panose="020B0609020204030204" pitchFamily="49" charset="0"/>
+              <a:cs typeface="Consolas" panose="020B0609020204030204" pitchFamily="49" charset="0"/>
+            </a:endParaRPr>
+          </a:p>
+          <a:p>
+            <a:endParaRPr lang="en-US" dirty="0">
+              <a:cs typeface="Consolas" panose="020B0609020204030204" pitchFamily="49" charset="0"/>
+            </a:endParaRPr>
+          </a:p>
+        </p:txBody>
+      </p:sp>
+      <p:sp>
+        <p:nvSpPr>
+          <p:cNvPr id="4" name="TextBox 3">
+            <a:extLst>
+              <a:ext uri="{FF2B5EF4-FFF2-40B4-BE49-F238E27FC236}">
+                <a16:creationId xmlns:a16="http://schemas.microsoft.com/office/drawing/2014/main" id="{7339BB36-1E60-FB59-6451-028D4FCB4EA0}"/>
+              </a:ext>
+            </a:extLst>
+          </p:cNvPr>
+          <p:cNvSpPr txBox="1"/>
+          <p:nvPr/>
+        </p:nvSpPr>
+        <p:spPr>
+          <a:xfrm>
+            <a:off x="838200" y="2808514"/>
+            <a:ext cx="10062370" cy="1754326"/>
+          </a:xfrm>
+          <a:prstGeom prst="rect">
+            <a:avLst/>
+          </a:prstGeom>
+          <a:noFill/>
+        </p:spPr>
+        <p:txBody>
+          <a:bodyPr wrap="none" rtlCol="0">
+            <a:spAutoFit/>
+          </a:bodyPr>
+          <a:lstStyle/>
+          <a:p>
+            <a:r>
+              <a:rPr lang="en-US" dirty="0">
+                <a:latin typeface="Consolas" panose="020B0609020204030204" pitchFamily="49" charset="0"/>
+                <a:cs typeface="Consolas" panose="020B0609020204030204" pitchFamily="49" charset="0"/>
+              </a:rPr>
+              <a:t>// Using ‘auto’ removes the need to type the (obvious) type of ‘p’</a:t>
+            </a:r>
+          </a:p>
+          <a:p>
+            <a:r>
+              <a:rPr lang="en-US" b="1" dirty="0">
+                <a:latin typeface="Consolas" panose="020B0609020204030204" pitchFamily="49" charset="0"/>
+                <a:cs typeface="Consolas" panose="020B0609020204030204" pitchFamily="49" charset="0"/>
+              </a:rPr>
+              <a:t>auto</a:t>
+            </a:r>
+            <a:r>
+              <a:rPr lang="en-US" dirty="0">
+                <a:latin typeface="Consolas" panose="020B0609020204030204" pitchFamily="49" charset="0"/>
+                <a:cs typeface="Consolas" panose="020B0609020204030204" pitchFamily="49" charset="0"/>
+              </a:rPr>
+              <a:t> p1 = std::</a:t>
+            </a:r>
+            <a:r>
+              <a:rPr lang="en-US" dirty="0" err="1">
+                <a:latin typeface="Consolas" panose="020B0609020204030204" pitchFamily="49" charset="0"/>
+                <a:cs typeface="Consolas" panose="020B0609020204030204" pitchFamily="49" charset="0"/>
+              </a:rPr>
+              <a:t>make_unique</a:t>
+            </a:r>
+            <a:r>
+              <a:rPr lang="en-US" dirty="0">
+                <a:latin typeface="Consolas" panose="020B0609020204030204" pitchFamily="49" charset="0"/>
+                <a:cs typeface="Consolas" panose="020B0609020204030204" pitchFamily="49" charset="0"/>
+              </a:rPr>
+              <a:t>&lt;</a:t>
+            </a:r>
+            <a:r>
+              <a:rPr lang="en-US" b="1" dirty="0">
+                <a:latin typeface="Consolas" panose="020B0609020204030204" pitchFamily="49" charset="0"/>
+                <a:cs typeface="Consolas" panose="020B0609020204030204" pitchFamily="49" charset="0"/>
+              </a:rPr>
+              <a:t>int</a:t>
+            </a:r>
+            <a:r>
+              <a:rPr lang="en-US" dirty="0">
+                <a:latin typeface="Consolas" panose="020B0609020204030204" pitchFamily="49" charset="0"/>
+                <a:cs typeface="Consolas" panose="020B0609020204030204" pitchFamily="49" charset="0"/>
+              </a:rPr>
+              <a:t>&gt;( 42 );</a:t>
+            </a:r>
+          </a:p>
+          <a:p>
+            <a:endParaRPr lang="en-US" dirty="0">
+              <a:latin typeface="Consolas" panose="020B0609020204030204" pitchFamily="49" charset="0"/>
+              <a:cs typeface="Consolas" panose="020B0609020204030204" pitchFamily="49" charset="0"/>
+            </a:endParaRPr>
+          </a:p>
+          <a:p>
+            <a:r>
+              <a:rPr lang="en-US" dirty="0">
+                <a:latin typeface="Consolas" panose="020B0609020204030204" pitchFamily="49" charset="0"/>
+                <a:cs typeface="Consolas" panose="020B0609020204030204" pitchFamily="49" charset="0"/>
+              </a:rPr>
+              <a:t>// std::</a:t>
+            </a:r>
+            <a:r>
+              <a:rPr lang="en-US" dirty="0" err="1">
+                <a:latin typeface="Consolas" panose="020B0609020204030204" pitchFamily="49" charset="0"/>
+                <a:cs typeface="Consolas" panose="020B0609020204030204" pitchFamily="49" charset="0"/>
+              </a:rPr>
+              <a:t>make_unique</a:t>
+            </a:r>
+            <a:r>
+              <a:rPr lang="en-US" dirty="0">
+                <a:latin typeface="Consolas" panose="020B0609020204030204" pitchFamily="49" charset="0"/>
+                <a:cs typeface="Consolas" panose="020B0609020204030204" pitchFamily="49" charset="0"/>
+              </a:rPr>
+              <a:t> takes arguments that are passed to the constructor</a:t>
+            </a:r>
+          </a:p>
+          <a:p>
+            <a:r>
+              <a:rPr lang="en-US" b="1" dirty="0">
+                <a:latin typeface="Consolas" panose="020B0609020204030204" pitchFamily="49" charset="0"/>
+                <a:cs typeface="Consolas" panose="020B0609020204030204" pitchFamily="49" charset="0"/>
+              </a:rPr>
+              <a:t>auto</a:t>
+            </a:r>
+            <a:r>
+              <a:rPr lang="en-US" dirty="0">
+                <a:latin typeface="Consolas" panose="020B0609020204030204" pitchFamily="49" charset="0"/>
+                <a:cs typeface="Consolas" panose="020B0609020204030204" pitchFamily="49" charset="0"/>
+              </a:rPr>
+              <a:t> p2 = std::</a:t>
+            </a:r>
+            <a:r>
+              <a:rPr lang="en-US" dirty="0" err="1">
+                <a:latin typeface="Consolas" panose="020B0609020204030204" pitchFamily="49" charset="0"/>
+                <a:cs typeface="Consolas" panose="020B0609020204030204" pitchFamily="49" charset="0"/>
+              </a:rPr>
+              <a:t>make_unique</a:t>
+            </a:r>
+            <a:r>
+              <a:rPr lang="en-US" dirty="0">
+                <a:latin typeface="Consolas" panose="020B0609020204030204" pitchFamily="49" charset="0"/>
+                <a:cs typeface="Consolas" panose="020B0609020204030204" pitchFamily="49" charset="0"/>
+              </a:rPr>
+              <a:t>&lt;std::string&gt;( ‘x’, 1024 );</a:t>
+            </a:r>
+          </a:p>
+          <a:p>
+            <a:r>
+              <a:rPr lang="en-US" dirty="0">
+                <a:latin typeface="Consolas" panose="020B0609020204030204" pitchFamily="49" charset="0"/>
+                <a:cs typeface="Consolas" panose="020B0609020204030204" pitchFamily="49" charset="0"/>
+              </a:rPr>
+              <a:t>    // Create a dynamically allocated string consisting of 1024 ‘x’ characters</a:t>
             </a:r>
           </a:p>
         </p:txBody>
@@ -6939,7 +8328,7 @@
     </p:spTree>
     <p:extLst>
       <p:ext uri="{BB962C8B-B14F-4D97-AF65-F5344CB8AC3E}">
-        <p14:creationId xmlns:p14="http://schemas.microsoft.com/office/powerpoint/2010/main" val="1835025073"/>
+        <p14:creationId xmlns:p14="http://schemas.microsoft.com/office/powerpoint/2010/main" val="798427625"/>
       </p:ext>
     </p:extLst>
   </p:cSld>

</xml_diff>